<commit_message>
Added infographic for common scenarios to deck
</commit_message>
<xml_diff>
--- a/Whiteboard design session/WDS trainer presentation - Cosmos DB Real Time Advanced Analytics.pptx
+++ b/Whiteboard design session/WDS trainer presentation - Cosmos DB Real Time Advanced Analytics.pptx
@@ -245,7 +245,7 @@
           <a:p>
             <a:fld id="{52A13B17-C506-4D51-BB37-16B365906619}" type="datetimeFigureOut">
               <a:rPr lang="en-US" smtClean="0"/>
-              <a:t>1/11/2019</a:t>
+              <a:t>1/12/2019</a:t>
             </a:fld>
             <a:endParaRPr lang="en-US"/>
           </a:p>
@@ -4622,7 +4622,7 @@
                   <a:prstClr val="black"/>
                 </a:solidFill>
               </a:rPr>
-              <a:t>1/11/2019 6:55 PM</a:t>
+              <a:t>1/12/2019 2:00 PM</a:t>
             </a:fld>
             <a:endParaRPr lang="en-US" dirty="0">
               <a:solidFill>
@@ -4869,7 +4869,7 @@
           <a:p>
             <a:fld id="{328EAAE8-B538-48EB-83B5-2B364220CC89}" type="datetime8">
               <a:rPr lang="en-US" smtClean="0"/>
-              <a:t>1/11/2019 6:55 PM</a:t>
+              <a:t>1/12/2019 2:00 PM</a:t>
             </a:fld>
             <a:endParaRPr lang="en-US" dirty="0"/>
           </a:p>
@@ -5001,7 +5001,7 @@
           <a:p>
             <a:fld id="{5A70A388-5CB4-42F2-85B9-1AE1F63398FA}" type="datetime8">
               <a:rPr lang="en-US" smtClean="0"/>
-              <a:t>1/11/2019 6:55 PM</a:t>
+              <a:t>1/12/2019 2:00 PM</a:t>
             </a:fld>
             <a:endParaRPr lang="en-US" dirty="0"/>
           </a:p>
@@ -5184,7 +5184,7 @@
           <a:p>
             <a:fld id="{6939CF7E-134C-4B4A-9853-17D7568CBCC2}" type="datetime8">
               <a:rPr lang="en-US" smtClean="0"/>
-              <a:t>1/11/2019 6:55 PM</a:t>
+              <a:t>1/12/2019 2:00 PM</a:t>
             </a:fld>
             <a:endParaRPr lang="en-US" dirty="0"/>
           </a:p>
@@ -5446,7 +5446,7 @@
           <a:p>
             <a:fld id="{B76134C8-AC9E-49DD-B3D6-722B1A93F18D}" type="datetime8">
               <a:rPr lang="en-US" smtClean="0"/>
-              <a:t>1/11/2019 6:55 PM</a:t>
+              <a:t>1/12/2019 2:00 PM</a:t>
             </a:fld>
             <a:endParaRPr lang="en-US" dirty="0"/>
           </a:p>
@@ -5627,7 +5627,7 @@
           <a:p>
             <a:fld id="{34FAA446-E61B-4D43-A3B1-7749AA6DC131}" type="datetime8">
               <a:rPr lang="en-US" smtClean="0"/>
-              <a:t>1/11/2019 6:55 PM</a:t>
+              <a:t>1/12/2019 2:00 PM</a:t>
             </a:fld>
             <a:endParaRPr lang="en-US" dirty="0"/>
           </a:p>
@@ -5808,7 +5808,7 @@
           <a:p>
             <a:fld id="{F86059B6-667D-4F24-AA48-46C1EA5D9E8E}" type="datetime8">
               <a:rPr lang="en-US" smtClean="0"/>
-              <a:t>1/11/2019 6:55 PM</a:t>
+              <a:t>1/12/2019 2:00 PM</a:t>
             </a:fld>
             <a:endParaRPr lang="en-US" dirty="0"/>
           </a:p>
@@ -5989,7 +5989,7 @@
           <a:p>
             <a:fld id="{35A2D088-BDBD-41A5-ADCE-5C6A4DC08057}" type="datetime8">
               <a:rPr lang="en-US" smtClean="0"/>
-              <a:t>1/11/2019 6:55 PM</a:t>
+              <a:t>1/12/2019 2:00 PM</a:t>
             </a:fld>
             <a:endParaRPr lang="en-US" dirty="0"/>
           </a:p>
@@ -6121,7 +6121,7 @@
           <a:p>
             <a:fld id="{174E4CE6-2FE4-433F-87B8-CB5DD266EBFC}" type="datetime8">
               <a:rPr lang="en-US" smtClean="0"/>
-              <a:t>1/11/2019 6:55 PM</a:t>
+              <a:t>1/12/2019 2:00 PM</a:t>
             </a:fld>
             <a:endParaRPr lang="en-US" dirty="0"/>
           </a:p>
@@ -6320,7 +6320,7 @@
                   <a:prstClr val="black"/>
                 </a:solidFill>
               </a:rPr>
-              <a:t>1/11/2019 6:55 PM</a:t>
+              <a:t>1/12/2019 2:00 PM</a:t>
             </a:fld>
             <a:endParaRPr lang="en-US" dirty="0">
               <a:solidFill>
@@ -19798,6 +19798,36 @@
           </a:p>
         </p:txBody>
       </p:sp>
+      <p:pic>
+        <p:nvPicPr>
+          <p:cNvPr id="4" name="Picture 3">
+            <a:extLst>
+              <a:ext uri="{FF2B5EF4-FFF2-40B4-BE49-F238E27FC236}">
+                <a16:creationId xmlns:a16="http://schemas.microsoft.com/office/drawing/2014/main" id="{FBE1216C-A00A-431B-BE38-1A55F1A057DA}"/>
+              </a:ext>
+            </a:extLst>
+          </p:cNvPr>
+          <p:cNvPicPr>
+            <a:picLocks noChangeAspect="1"/>
+          </p:cNvPicPr>
+          <p:nvPr/>
+        </p:nvPicPr>
+        <p:blipFill>
+          <a:blip r:embed="rId3"/>
+          <a:stretch>
+            <a:fillRect/>
+          </a:stretch>
+        </p:blipFill>
+        <p:spPr>
+          <a:xfrm>
+            <a:off x="928301" y="1028254"/>
+            <a:ext cx="10335398" cy="5702909"/>
+          </a:xfrm>
+          <a:prstGeom prst="rect">
+            <a:avLst/>
+          </a:prstGeom>
+        </p:spPr>
+      </p:pic>
     </p:spTree>
     <p:extLst>
       <p:ext uri="{BB962C8B-B14F-4D97-AF65-F5344CB8AC3E}">
@@ -33381,13 +33411,13 @@
   <p:clrMapOvr>
     <a:masterClrMapping/>
   </p:clrMapOvr>
-  <mc:AlternateContent xmlns:mc="http://schemas.openxmlformats.org/markup-compatibility/2006">
-    <mc:Choice xmlns:p14="http://schemas.microsoft.com/office/powerpoint/2010/main" Requires="p14">
+  <mc:AlternateContent xmlns:mc="http://schemas.openxmlformats.org/markup-compatibility/2006" xmlns:p14="http://schemas.microsoft.com/office/powerpoint/2010/main">
+    <mc:Choice Requires="p14">
       <p:transition spd="med" p14:dur="700">
         <p:fade/>
       </p:transition>
     </mc:Choice>
-    <mc:Fallback>
+    <mc:Fallback xmlns="">
       <p:transition spd="med">
         <p:fade/>
       </p:transition>
@@ -33789,13 +33819,13 @@
   <p:clrMapOvr>
     <a:masterClrMapping/>
   </p:clrMapOvr>
-  <mc:AlternateContent xmlns:mc="http://schemas.openxmlformats.org/markup-compatibility/2006">
-    <mc:Choice xmlns:p14="http://schemas.microsoft.com/office/powerpoint/2010/main" Requires="p14">
+  <mc:AlternateContent xmlns:mc="http://schemas.openxmlformats.org/markup-compatibility/2006" xmlns:p14="http://schemas.microsoft.com/office/powerpoint/2010/main">
+    <mc:Choice Requires="p14">
       <p:transition spd="med" p14:dur="700">
         <p:fade/>
       </p:transition>
     </mc:Choice>
-    <mc:Fallback>
+    <mc:Fallback xmlns="">
       <p:transition spd="med">
         <p:fade/>
       </p:transition>
@@ -33966,13 +33996,13 @@
   <p:clrMapOvr>
     <a:masterClrMapping/>
   </p:clrMapOvr>
-  <mc:AlternateContent xmlns:mc="http://schemas.openxmlformats.org/markup-compatibility/2006">
-    <mc:Choice xmlns:p14="http://schemas.microsoft.com/office/powerpoint/2010/main" Requires="p14">
+  <mc:AlternateContent xmlns:mc="http://schemas.openxmlformats.org/markup-compatibility/2006" xmlns:p14="http://schemas.microsoft.com/office/powerpoint/2010/main">
+    <mc:Choice Requires="p14">
       <p:transition spd="med" p14:dur="700">
         <p:fade/>
       </p:transition>
     </mc:Choice>
-    <mc:Fallback>
+    <mc:Fallback xmlns="">
       <p:transition spd="med">
         <p:fade/>
       </p:transition>
@@ -34057,13 +34087,13 @@
   <p:clrMapOvr>
     <a:masterClrMapping/>
   </p:clrMapOvr>
-  <mc:AlternateContent xmlns:mc="http://schemas.openxmlformats.org/markup-compatibility/2006">
-    <mc:Choice xmlns:p14="http://schemas.microsoft.com/office/powerpoint/2010/main" Requires="p14">
+  <mc:AlternateContent xmlns:mc="http://schemas.openxmlformats.org/markup-compatibility/2006" xmlns:p14="http://schemas.microsoft.com/office/powerpoint/2010/main">
+    <mc:Choice Requires="p14">
       <p:transition spd="med" p14:dur="700">
         <p:fade/>
       </p:transition>
     </mc:Choice>
-    <mc:Fallback>
+    <mc:Fallback xmlns="">
       <p:transition spd="med">
         <p:fade/>
       </p:transition>
@@ -34125,13 +34155,13 @@
   <p:clrMapOvr>
     <a:masterClrMapping/>
   </p:clrMapOvr>
-  <mc:AlternateContent xmlns:mc="http://schemas.openxmlformats.org/markup-compatibility/2006">
-    <mc:Choice xmlns:p14="http://schemas.microsoft.com/office/powerpoint/2010/main" Requires="p14">
+  <mc:AlternateContent xmlns:mc="http://schemas.openxmlformats.org/markup-compatibility/2006" xmlns:p14="http://schemas.microsoft.com/office/powerpoint/2010/main">
+    <mc:Choice Requires="p14">
       <p:transition spd="med" p14:dur="700">
         <p:fade/>
       </p:transition>
     </mc:Choice>
-    <mc:Fallback>
+    <mc:Fallback xmlns="">
       <p:transition spd="med">
         <p:fade/>
       </p:transition>
@@ -34189,13 +34219,13 @@
   <p:clrMapOvr>
     <a:masterClrMapping/>
   </p:clrMapOvr>
-  <mc:AlternateContent xmlns:mc="http://schemas.openxmlformats.org/markup-compatibility/2006">
-    <mc:Choice xmlns:p14="http://schemas.microsoft.com/office/powerpoint/2010/main" Requires="p14">
+  <mc:AlternateContent xmlns:mc="http://schemas.openxmlformats.org/markup-compatibility/2006" xmlns:p14="http://schemas.microsoft.com/office/powerpoint/2010/main">
+    <mc:Choice Requires="p14">
       <p:transition spd="med" p14:dur="700">
         <p:fade/>
       </p:transition>
     </mc:Choice>
-    <mc:Fallback>
+    <mc:Fallback xmlns="">
       <p:transition spd="med">
         <p:fade/>
       </p:transition>
@@ -34257,13 +34287,13 @@
   <p:clrMapOvr>
     <a:masterClrMapping/>
   </p:clrMapOvr>
-  <mc:AlternateContent xmlns:mc="http://schemas.openxmlformats.org/markup-compatibility/2006">
-    <mc:Choice xmlns:p14="http://schemas.microsoft.com/office/powerpoint/2010/main" Requires="p14">
+  <mc:AlternateContent xmlns:mc="http://schemas.openxmlformats.org/markup-compatibility/2006" xmlns:p14="http://schemas.microsoft.com/office/powerpoint/2010/main">
+    <mc:Choice Requires="p14">
       <p:transition spd="med" p14:dur="700">
         <p:fade/>
       </p:transition>
     </mc:Choice>
-    <mc:Fallback>
+    <mc:Fallback xmlns="">
       <p:transition spd="med">
         <p:fade/>
       </p:transition>
@@ -34343,13 +34373,13 @@
   <p:clrMapOvr>
     <a:masterClrMapping/>
   </p:clrMapOvr>
-  <mc:AlternateContent xmlns:mc="http://schemas.openxmlformats.org/markup-compatibility/2006">
-    <mc:Choice xmlns:p14="http://schemas.microsoft.com/office/powerpoint/2010/main" Requires="p14">
+  <mc:AlternateContent xmlns:mc="http://schemas.openxmlformats.org/markup-compatibility/2006" xmlns:p14="http://schemas.microsoft.com/office/powerpoint/2010/main">
+    <mc:Choice Requires="p14">
       <p:transition spd="med" p14:dur="700">
         <p:fade/>
       </p:transition>
     </mc:Choice>
-    <mc:Fallback>
+    <mc:Fallback xmlns="">
       <p:transition spd="med">
         <p:fade/>
       </p:transition>
@@ -34462,13 +34492,13 @@
   <p:clrMapOvr>
     <a:masterClrMapping/>
   </p:clrMapOvr>
-  <mc:AlternateContent xmlns:mc="http://schemas.openxmlformats.org/markup-compatibility/2006">
-    <mc:Choice xmlns:p14="http://schemas.microsoft.com/office/powerpoint/2010/main" Requires="p14">
+  <mc:AlternateContent xmlns:mc="http://schemas.openxmlformats.org/markup-compatibility/2006" xmlns:p14="http://schemas.microsoft.com/office/powerpoint/2010/main">
+    <mc:Choice Requires="p14">
       <p:transition spd="med" p14:dur="700">
         <p:fade/>
       </p:transition>
     </mc:Choice>
-    <mc:Fallback>
+    <mc:Fallback xmlns="">
       <p:transition spd="med">
         <p:fade/>
       </p:transition>
@@ -37203,12 +37233,12 @@
 </file>
 
 <file path=customXml/item1.xml><?xml version="1.0" encoding="utf-8"?>
-<?mso-contentType ?>
-<FormTemplates xmlns="http://schemas.microsoft.com/sharepoint/v3/contenttype/forms">
-  <Display>DocumentLibraryForm</Display>
-  <Edit>DocumentLibraryForm</Edit>
-  <New>DocumentLibraryForm</New>
-</FormTemplates>
+<p:properties xmlns:p="http://schemas.microsoft.com/office/2006/metadata/properties" xmlns:xsi="http://www.w3.org/2001/XMLSchema-instance" xmlns:pc="http://schemas.microsoft.com/office/infopath/2007/PartnerControls">
+  <documentManagement>
+    <_ip_UnifiedCompliancePolicyUIAction xmlns="http://schemas.microsoft.com/sharepoint/v3" xsi:nil="true"/>
+    <_ip_UnifiedCompliancePolicyProperties xmlns="http://schemas.microsoft.com/sharepoint/v3" xsi:nil="true"/>
+  </documentManagement>
+</p:properties>
 </file>
 
 <file path=customXml/item2.xml><?xml version="1.0" encoding="utf-8"?>
@@ -37414,18 +37444,28 @@
 </file>
 
 <file path=customXml/item3.xml><?xml version="1.0" encoding="utf-8"?>
-<p:properties xmlns:p="http://schemas.microsoft.com/office/2006/metadata/properties" xmlns:xsi="http://www.w3.org/2001/XMLSchema-instance" xmlns:pc="http://schemas.microsoft.com/office/infopath/2007/PartnerControls">
-  <documentManagement>
-    <_ip_UnifiedCompliancePolicyUIAction xmlns="http://schemas.microsoft.com/sharepoint/v3" xsi:nil="true"/>
-    <_ip_UnifiedCompliancePolicyProperties xmlns="http://schemas.microsoft.com/sharepoint/v3" xsi:nil="true"/>
-  </documentManagement>
-</p:properties>
+<?mso-contentType ?>
+<FormTemplates xmlns="http://schemas.microsoft.com/sharepoint/v3/contenttype/forms">
+  <Display>DocumentLibraryForm</Display>
+  <Edit>DocumentLibraryForm</Edit>
+  <New>DocumentLibraryForm</New>
+</FormTemplates>
 </file>
 
 <file path=customXml/itemProps1.xml><?xml version="1.0" encoding="utf-8"?>
-<ds:datastoreItem xmlns:ds="http://schemas.openxmlformats.org/officeDocument/2006/customXml" ds:itemID="{F18501AF-04CF-4482-BAE1-607B49DDC378}">
+<ds:datastoreItem xmlns:ds="http://schemas.openxmlformats.org/officeDocument/2006/customXml" ds:itemID="{BAF7D529-36AB-45DA-B239-2F912F2D1610}">
   <ds:schemaRefs>
-    <ds:schemaRef ds:uri="http://schemas.microsoft.com/sharepoint/v3/contenttype/forms"/>
+    <ds:schemaRef ds:uri="http://purl.org/dc/elements/1.1/"/>
+    <ds:schemaRef ds:uri="http://schemas.microsoft.com/office/2006/metadata/properties"/>
+    <ds:schemaRef ds:uri="http://purl.org/dc/terms/"/>
+    <ds:schemaRef ds:uri="http://schemas.microsoft.com/office/infopath/2007/PartnerControls"/>
+    <ds:schemaRef ds:uri="http://purl.org/dc/dcmitype/"/>
+    <ds:schemaRef ds:uri="http://schemas.openxmlformats.org/package/2006/metadata/core-properties"/>
+    <ds:schemaRef ds:uri="http://schemas.microsoft.com/office/2006/documentManagement/types"/>
+    <ds:schemaRef ds:uri="d9c797ad-d7c3-4982-82b7-81352a75e4a5"/>
+    <ds:schemaRef ds:uri="2023ac63-7b75-4916-a9ee-591457758eee"/>
+    <ds:schemaRef ds:uri="http://schemas.microsoft.com/sharepoint/v3"/>
+    <ds:schemaRef ds:uri="http://www.w3.org/XML/1998/namespace"/>
   </ds:schemaRefs>
 </ds:datastoreItem>
 </file>
@@ -37451,19 +37491,9 @@
 </file>
 
 <file path=customXml/itemProps3.xml><?xml version="1.0" encoding="utf-8"?>
-<ds:datastoreItem xmlns:ds="http://schemas.openxmlformats.org/officeDocument/2006/customXml" ds:itemID="{BAF7D529-36AB-45DA-B239-2F912F2D1610}">
+<ds:datastoreItem xmlns:ds="http://schemas.openxmlformats.org/officeDocument/2006/customXml" ds:itemID="{F18501AF-04CF-4482-BAE1-607B49DDC378}">
   <ds:schemaRefs>
-    <ds:schemaRef ds:uri="http://purl.org/dc/elements/1.1/"/>
-    <ds:schemaRef ds:uri="http://schemas.microsoft.com/office/2006/metadata/properties"/>
-    <ds:schemaRef ds:uri="http://purl.org/dc/terms/"/>
-    <ds:schemaRef ds:uri="http://schemas.microsoft.com/office/infopath/2007/PartnerControls"/>
-    <ds:schemaRef ds:uri="http://purl.org/dc/dcmitype/"/>
-    <ds:schemaRef ds:uri="http://schemas.openxmlformats.org/package/2006/metadata/core-properties"/>
-    <ds:schemaRef ds:uri="http://schemas.microsoft.com/office/2006/documentManagement/types"/>
-    <ds:schemaRef ds:uri="d9c797ad-d7c3-4982-82b7-81352a75e4a5"/>
-    <ds:schemaRef ds:uri="2023ac63-7b75-4916-a9ee-591457758eee"/>
-    <ds:schemaRef ds:uri="http://schemas.microsoft.com/sharepoint/v3"/>
-    <ds:schemaRef ds:uri="http://www.w3.org/XML/1998/namespace"/>
+    <ds:schemaRef ds:uri="http://schemas.microsoft.com/sharepoint/v3/contenttype/forms"/>
   </ds:schemaRefs>
 </ds:datastoreItem>
 </file>
</xml_diff>

<commit_message>
Updated common scenarios infographic
</commit_message>
<xml_diff>
--- a/Whiteboard design session/WDS trainer presentation - Cosmos DB Real Time Advanced Analytics.pptx
+++ b/Whiteboard design session/WDS trainer presentation - Cosmos DB Real Time Advanced Analytics.pptx
@@ -4622,7 +4622,7 @@
                   <a:prstClr val="black"/>
                 </a:solidFill>
               </a:rPr>
-              <a:t>1/12/2019 2:00 PM</a:t>
+              <a:t>1/12/2019 2:26 PM</a:t>
             </a:fld>
             <a:endParaRPr lang="en-US" dirty="0">
               <a:solidFill>
@@ -4869,7 +4869,7 @@
           <a:p>
             <a:fld id="{328EAAE8-B538-48EB-83B5-2B364220CC89}" type="datetime8">
               <a:rPr lang="en-US" smtClean="0"/>
-              <a:t>1/12/2019 2:00 PM</a:t>
+              <a:t>1/12/2019 2:26 PM</a:t>
             </a:fld>
             <a:endParaRPr lang="en-US" dirty="0"/>
           </a:p>
@@ -5001,7 +5001,7 @@
           <a:p>
             <a:fld id="{5A70A388-5CB4-42F2-85B9-1AE1F63398FA}" type="datetime8">
               <a:rPr lang="en-US" smtClean="0"/>
-              <a:t>1/12/2019 2:00 PM</a:t>
+              <a:t>1/12/2019 2:26 PM</a:t>
             </a:fld>
             <a:endParaRPr lang="en-US" dirty="0"/>
           </a:p>
@@ -5184,7 +5184,7 @@
           <a:p>
             <a:fld id="{6939CF7E-134C-4B4A-9853-17D7568CBCC2}" type="datetime8">
               <a:rPr lang="en-US" smtClean="0"/>
-              <a:t>1/12/2019 2:00 PM</a:t>
+              <a:t>1/12/2019 2:26 PM</a:t>
             </a:fld>
             <a:endParaRPr lang="en-US" dirty="0"/>
           </a:p>
@@ -5446,7 +5446,7 @@
           <a:p>
             <a:fld id="{B76134C8-AC9E-49DD-B3D6-722B1A93F18D}" type="datetime8">
               <a:rPr lang="en-US" smtClean="0"/>
-              <a:t>1/12/2019 2:00 PM</a:t>
+              <a:t>1/12/2019 2:26 PM</a:t>
             </a:fld>
             <a:endParaRPr lang="en-US" dirty="0"/>
           </a:p>
@@ -5627,7 +5627,7 @@
           <a:p>
             <a:fld id="{34FAA446-E61B-4D43-A3B1-7749AA6DC131}" type="datetime8">
               <a:rPr lang="en-US" smtClean="0"/>
-              <a:t>1/12/2019 2:00 PM</a:t>
+              <a:t>1/12/2019 2:26 PM</a:t>
             </a:fld>
             <a:endParaRPr lang="en-US" dirty="0"/>
           </a:p>
@@ -5808,7 +5808,7 @@
           <a:p>
             <a:fld id="{F86059B6-667D-4F24-AA48-46C1EA5D9E8E}" type="datetime8">
               <a:rPr lang="en-US" smtClean="0"/>
-              <a:t>1/12/2019 2:00 PM</a:t>
+              <a:t>1/12/2019 2:26 PM</a:t>
             </a:fld>
             <a:endParaRPr lang="en-US" dirty="0"/>
           </a:p>
@@ -5989,7 +5989,7 @@
           <a:p>
             <a:fld id="{35A2D088-BDBD-41A5-ADCE-5C6A4DC08057}" type="datetime8">
               <a:rPr lang="en-US" smtClean="0"/>
-              <a:t>1/12/2019 2:00 PM</a:t>
+              <a:t>1/12/2019 2:26 PM</a:t>
             </a:fld>
             <a:endParaRPr lang="en-US" dirty="0"/>
           </a:p>
@@ -6121,7 +6121,7 @@
           <a:p>
             <a:fld id="{174E4CE6-2FE4-433F-87B8-CB5DD266EBFC}" type="datetime8">
               <a:rPr lang="en-US" smtClean="0"/>
-              <a:t>1/12/2019 2:00 PM</a:t>
+              <a:t>1/12/2019 2:26 PM</a:t>
             </a:fld>
             <a:endParaRPr lang="en-US" dirty="0"/>
           </a:p>
@@ -6320,7 +6320,7 @@
                   <a:prstClr val="black"/>
                 </a:solidFill>
               </a:rPr>
-              <a:t>1/12/2019 2:00 PM</a:t>
+              <a:t>1/12/2019 2:26 PM</a:t>
             </a:fld>
             <a:endParaRPr lang="en-US" dirty="0">
               <a:solidFill>
@@ -19813,15 +19813,21 @@
           <p:nvPr/>
         </p:nvPicPr>
         <p:blipFill>
-          <a:blip r:embed="rId3"/>
+          <a:blip r:embed="rId3">
+            <a:extLst>
+              <a:ext uri="{28A0092B-C50C-407E-A947-70E740481C1C}">
+                <a14:useLocalDpi xmlns:a14="http://schemas.microsoft.com/office/drawing/2010/main" val="0"/>
+              </a:ext>
+            </a:extLst>
+          </a:blip>
           <a:stretch>
             <a:fillRect/>
           </a:stretch>
         </p:blipFill>
         <p:spPr>
           <a:xfrm>
-            <a:off x="928301" y="1028254"/>
-            <a:ext cx="10335398" cy="5702909"/>
+            <a:off x="928301" y="1040166"/>
+            <a:ext cx="10335398" cy="5679085"/>
           </a:xfrm>
           <a:prstGeom prst="rect">
             <a:avLst/>
@@ -37233,12 +37239,12 @@
 </file>
 
 <file path=customXml/item1.xml><?xml version="1.0" encoding="utf-8"?>
-<p:properties xmlns:p="http://schemas.microsoft.com/office/2006/metadata/properties" xmlns:xsi="http://www.w3.org/2001/XMLSchema-instance" xmlns:pc="http://schemas.microsoft.com/office/infopath/2007/PartnerControls">
-  <documentManagement>
-    <_ip_UnifiedCompliancePolicyUIAction xmlns="http://schemas.microsoft.com/sharepoint/v3" xsi:nil="true"/>
-    <_ip_UnifiedCompliancePolicyProperties xmlns="http://schemas.microsoft.com/sharepoint/v3" xsi:nil="true"/>
-  </documentManagement>
-</p:properties>
+<?mso-contentType ?>
+<FormTemplates xmlns="http://schemas.microsoft.com/sharepoint/v3/contenttype/forms">
+  <Display>DocumentLibraryForm</Display>
+  <Edit>DocumentLibraryForm</Edit>
+  <New>DocumentLibraryForm</New>
+</FormTemplates>
 </file>
 
 <file path=customXml/item2.xml><?xml version="1.0" encoding="utf-8"?>
@@ -37444,28 +37450,18 @@
 </file>
 
 <file path=customXml/item3.xml><?xml version="1.0" encoding="utf-8"?>
-<?mso-contentType ?>
-<FormTemplates xmlns="http://schemas.microsoft.com/sharepoint/v3/contenttype/forms">
-  <Display>DocumentLibraryForm</Display>
-  <Edit>DocumentLibraryForm</Edit>
-  <New>DocumentLibraryForm</New>
-</FormTemplates>
+<p:properties xmlns:p="http://schemas.microsoft.com/office/2006/metadata/properties" xmlns:xsi="http://www.w3.org/2001/XMLSchema-instance" xmlns:pc="http://schemas.microsoft.com/office/infopath/2007/PartnerControls">
+  <documentManagement>
+    <_ip_UnifiedCompliancePolicyUIAction xmlns="http://schemas.microsoft.com/sharepoint/v3" xsi:nil="true"/>
+    <_ip_UnifiedCompliancePolicyProperties xmlns="http://schemas.microsoft.com/sharepoint/v3" xsi:nil="true"/>
+  </documentManagement>
+</p:properties>
 </file>
 
 <file path=customXml/itemProps1.xml><?xml version="1.0" encoding="utf-8"?>
-<ds:datastoreItem xmlns:ds="http://schemas.openxmlformats.org/officeDocument/2006/customXml" ds:itemID="{BAF7D529-36AB-45DA-B239-2F912F2D1610}">
+<ds:datastoreItem xmlns:ds="http://schemas.openxmlformats.org/officeDocument/2006/customXml" ds:itemID="{F18501AF-04CF-4482-BAE1-607B49DDC378}">
   <ds:schemaRefs>
-    <ds:schemaRef ds:uri="http://purl.org/dc/elements/1.1/"/>
-    <ds:schemaRef ds:uri="http://schemas.microsoft.com/office/2006/metadata/properties"/>
-    <ds:schemaRef ds:uri="http://purl.org/dc/terms/"/>
-    <ds:schemaRef ds:uri="http://schemas.microsoft.com/office/infopath/2007/PartnerControls"/>
-    <ds:schemaRef ds:uri="http://purl.org/dc/dcmitype/"/>
-    <ds:schemaRef ds:uri="http://schemas.openxmlformats.org/package/2006/metadata/core-properties"/>
-    <ds:schemaRef ds:uri="http://schemas.microsoft.com/office/2006/documentManagement/types"/>
-    <ds:schemaRef ds:uri="d9c797ad-d7c3-4982-82b7-81352a75e4a5"/>
-    <ds:schemaRef ds:uri="2023ac63-7b75-4916-a9ee-591457758eee"/>
-    <ds:schemaRef ds:uri="http://schemas.microsoft.com/sharepoint/v3"/>
-    <ds:schemaRef ds:uri="http://www.w3.org/XML/1998/namespace"/>
+    <ds:schemaRef ds:uri="http://schemas.microsoft.com/sharepoint/v3/contenttype/forms"/>
   </ds:schemaRefs>
 </ds:datastoreItem>
 </file>
@@ -37491,9 +37487,19 @@
 </file>
 
 <file path=customXml/itemProps3.xml><?xml version="1.0" encoding="utf-8"?>
-<ds:datastoreItem xmlns:ds="http://schemas.openxmlformats.org/officeDocument/2006/customXml" ds:itemID="{F18501AF-04CF-4482-BAE1-607B49DDC378}">
+<ds:datastoreItem xmlns:ds="http://schemas.openxmlformats.org/officeDocument/2006/customXml" ds:itemID="{BAF7D529-36AB-45DA-B239-2F912F2D1610}">
   <ds:schemaRefs>
-    <ds:schemaRef ds:uri="http://schemas.microsoft.com/sharepoint/v3/contenttype/forms"/>
+    <ds:schemaRef ds:uri="http://purl.org/dc/elements/1.1/"/>
+    <ds:schemaRef ds:uri="http://schemas.microsoft.com/office/2006/metadata/properties"/>
+    <ds:schemaRef ds:uri="http://purl.org/dc/terms/"/>
+    <ds:schemaRef ds:uri="http://schemas.microsoft.com/office/infopath/2007/PartnerControls"/>
+    <ds:schemaRef ds:uri="http://purl.org/dc/dcmitype/"/>
+    <ds:schemaRef ds:uri="http://schemas.openxmlformats.org/package/2006/metadata/core-properties"/>
+    <ds:schemaRef ds:uri="http://schemas.microsoft.com/office/2006/documentManagement/types"/>
+    <ds:schemaRef ds:uri="d9c797ad-d7c3-4982-82b7-81352a75e4a5"/>
+    <ds:schemaRef ds:uri="2023ac63-7b75-4916-a9ee-591457758eee"/>
+    <ds:schemaRef ds:uri="http://schemas.microsoft.com/sharepoint/v3"/>
+    <ds:schemaRef ds:uri="http://www.w3.org/XML/1998/namespace"/>
   </ds:schemaRefs>
 </ds:datastoreItem>
 </file>
</xml_diff>

<commit_message>
Updates based on SME feedback. Addresses #6 and #7.
</commit_message>
<xml_diff>
--- a/Whiteboard design session/WDS trainer presentation - Cosmos DB Real Time Advanced Analytics.pptx
+++ b/Whiteboard design session/WDS trainer presentation - Cosmos DB Real Time Advanced Analytics.pptx
@@ -248,7 +248,7 @@
           <a:p>
             <a:fld id="{52A13B17-C506-4D51-BB37-16B365906619}" type="datetimeFigureOut">
               <a:rPr lang="en-US" smtClean="0"/>
-              <a:t>1/27/2019</a:t>
+              <a:t>2/4/2019</a:t>
             </a:fld>
             <a:endParaRPr lang="en-US"/>
           </a:p>
@@ -713,7 +713,7 @@
                 <a:ea typeface="+mn-ea"/>
                 <a:cs typeface="+mn-cs"/>
               </a:rPr>
-              <a:t>We are concerned about how much it costs to use Cosmos DB for our solution. What is the real value in using this service?</a:t>
+              <a:t>We are concerned about how much it costs to use Cosmos DB for our solution. What is the real value of the service, and how do we set up Cosmos DB in an optimal way?</a:t>
             </a:r>
           </a:p>
         </p:txBody>
@@ -1228,7 +1228,7 @@
                 <a:ea typeface="+mn-ea"/>
                 <a:cs typeface="+mn-cs"/>
               </a:rPr>
-              <a:t>The solution begins with the payment transaction systems writing transactions to Azure Cosmos DB. With change feed enabled in Cosmos DB, the transactions can be read as a stream of incoming data within an Azure Databricks notebook, using the `azure-</a:t>
+              <a:t>The solution begins with the payment transaction systems writing transactions to Azure Cosmos DB. Using the built-in change feed feature in Cosmos DB, the transactions can be read as a stream of incoming data within an Azure Databricks notebook, using the `azure-</a:t>
             </a:r>
             <a:r>
               <a:rPr lang="en-US" sz="1200" b="0" kern="1200" dirty="0" err="1">
@@ -1276,10 +1276,12 @@
                 <a:ea typeface="+mn-ea"/>
                 <a:cs typeface="+mn-cs"/>
               </a:rPr>
-              <a:t>) to the transaction data. Tables created in Databricks over this data can be accessed by business analysts using dashboards and reports in Power BI, by using Power BI's Spark connector. Alternately, semantic models can be stored in Azure Analysis Service to serve data to Power BI, eliminating the need to keep a dedicated Databricks cluster running for reporting. Data scientists and engineers can create their own reports against Databricks tables, using Azure Databricks notebooks. Azure Databricks also supports training and validating the machine learning model, using historical data stored in Azure Data Lake Storage. The model can be periodically re-trained using the data stored in Delta tables or other historical tables. The Azure Machine Learning service is used to deploy the trained model as a real-time scoring web service running on a highly available Azure Kubernetes Service cluster (AKS cluster). The trained model is also used in scheduled offline scoring through Databricks jobs, and the "suspicious activity" output is stored in Azure Cosmos DB so it is globally available in regions closest to </a:t>
-            </a:r>
-            <a:r>
-              <a:rPr lang="en-US" sz="1200" b="0" kern="1200" dirty="0" err="1">
+              <a:t>) to the transaction data. Tables created in Databricks over this data can be accessed by business analysts using dashboards and reports in Power BI, by using Power BI's Spark connector. Alternately, semantic models can be stored in Azure Analysis Service to serve data to Power BI, eliminating the need to keep a dedicated Databricks cluster running for reporting.</a:t>
+            </a:r>
+          </a:p>
+          <a:p>
+            <a:r>
+              <a:rPr lang="en-US" sz="1200" b="0" kern="1200" dirty="0">
                 <a:solidFill>
                   <a:schemeClr val="tx1"/>
                 </a:solidFill>
@@ -1288,8 +1290,21 @@
                 <a:ea typeface="+mn-ea"/>
                 <a:cs typeface="+mn-cs"/>
               </a:rPr>
-              <a:t>Woodgrove</a:t>
-            </a:r>
+              <a:t>Data scientists and engineers can create their own reports against Databricks tables, using Azure Databricks notebooks.</a:t>
+            </a:r>
+          </a:p>
+          <a:p>
+            <a:endParaRPr lang="en-US" sz="1200" b="0" kern="1200" dirty="0">
+              <a:solidFill>
+                <a:schemeClr val="tx1"/>
+              </a:solidFill>
+              <a:effectLst/>
+              <a:latin typeface="+mn-lt"/>
+              <a:ea typeface="+mn-ea"/>
+              <a:cs typeface="+mn-cs"/>
+            </a:endParaRPr>
+          </a:p>
+          <a:p>
             <a:r>
               <a:rPr lang="en-US" sz="1200" b="0" kern="1200" dirty="0">
                 <a:solidFill>
@@ -1300,7 +1315,68 @@
                 <a:ea typeface="+mn-ea"/>
                 <a:cs typeface="+mn-cs"/>
               </a:rPr>
-              <a:t> Bank's customers through their web applications. Finally, Azure Key Vault is used to securely store secrets, such as account keys and connection strings, and serves as a backing for Azure Databricks secret scopes.</a:t>
+              <a:t>Azure Databricks also supports training and validating the machine learning model, using historical data stored in Azure Data Lake Storage. The model can be periodically re-trained using the data stored in Delta tables or other historical tables. The Azure Machine Learning service is used to deploy the trained model as a real-time scoring web service running on a highly available Azure Kubernetes Service cluster (AKS cluster). The trained model is also used in scheduled offline scoring through Databricks jobs, and the "suspicious activity" output is stored in Azure Cosmos DB so it is globally available in regions closest to </a:t>
+            </a:r>
+            <a:r>
+              <a:rPr lang="en-US" sz="1200" b="0" kern="1200" dirty="0" err="1">
+                <a:solidFill>
+                  <a:schemeClr val="tx1"/>
+                </a:solidFill>
+                <a:effectLst/>
+                <a:latin typeface="+mn-lt"/>
+                <a:ea typeface="+mn-ea"/>
+                <a:cs typeface="+mn-cs"/>
+              </a:rPr>
+              <a:t>Woodgrove</a:t>
+            </a:r>
+            <a:r>
+              <a:rPr lang="en-US" sz="1200" b="0" kern="1200" dirty="0">
+                <a:solidFill>
+                  <a:schemeClr val="tx1"/>
+                </a:solidFill>
+                <a:effectLst/>
+                <a:latin typeface="+mn-lt"/>
+                <a:ea typeface="+mn-ea"/>
+                <a:cs typeface="+mn-cs"/>
+              </a:rPr>
+              <a:t> Bank's customers through their web applications.</a:t>
+            </a:r>
+          </a:p>
+          <a:p>
+            <a:endParaRPr lang="en-US" sz="1200" b="0" kern="1200">
+              <a:solidFill>
+                <a:schemeClr val="tx1"/>
+              </a:solidFill>
+              <a:effectLst/>
+              <a:latin typeface="+mn-lt"/>
+              <a:ea typeface="+mn-ea"/>
+              <a:cs typeface="+mn-cs"/>
+            </a:endParaRPr>
+          </a:p>
+          <a:p>
+            <a:r>
+              <a:rPr lang="en-US" sz="1200" b="0" kern="1200">
+                <a:solidFill>
+                  <a:schemeClr val="tx1"/>
+                </a:solidFill>
+                <a:effectLst/>
+                <a:latin typeface="+mn-lt"/>
+                <a:ea typeface="+mn-ea"/>
+                <a:cs typeface="+mn-cs"/>
+              </a:rPr>
+              <a:t>Finally</a:t>
+            </a:r>
+            <a:r>
+              <a:rPr lang="en-US" sz="1200" b="0" kern="1200" dirty="0">
+                <a:solidFill>
+                  <a:schemeClr val="tx1"/>
+                </a:solidFill>
+                <a:effectLst/>
+                <a:latin typeface="+mn-lt"/>
+                <a:ea typeface="+mn-ea"/>
+                <a:cs typeface="+mn-cs"/>
+              </a:rPr>
+              <a:t>, Azure Key Vault is used to securely store secrets, such as account keys and connection strings, and serves as a backing for Azure Databricks secret scopes.</a:t>
             </a:r>
           </a:p>
         </p:txBody>
@@ -4754,7 +4830,7 @@
                 <a:ea typeface="+mn-ea"/>
                 <a:cs typeface="+mn-cs"/>
               </a:rPr>
-              <a:t>We are concerned about how much it costs to use Cosmos DB for our solution. What is the real value in using this service?</a:t>
+              <a:t>We are concerned about how much it costs to use Cosmos DB for our solution. What is the real value in using this service, and how do we set up Cosmos DB in an optimal way?</a:t>
             </a:r>
             <a:endParaRPr lang="en-US" sz="1200" b="1" i="0" kern="1200" dirty="0">
               <a:solidFill>
@@ -5215,7 +5291,7 @@
                   <a:prstClr val="black"/>
                 </a:solidFill>
               </a:rPr>
-              <a:t>1/27/2019 4:51 PM</a:t>
+              <a:t>2/4/2019 8:48 AM</a:t>
             </a:fld>
             <a:endParaRPr lang="en-US" dirty="0">
               <a:solidFill>
@@ -5462,7 +5538,7 @@
           <a:p>
             <a:fld id="{328EAAE8-B538-48EB-83B5-2B364220CC89}" type="datetime8">
               <a:rPr lang="en-US" smtClean="0"/>
-              <a:t>1/27/2019 4:51 PM</a:t>
+              <a:t>2/4/2019 8:48 AM</a:t>
             </a:fld>
             <a:endParaRPr lang="en-US" dirty="0"/>
           </a:p>
@@ -5594,7 +5670,7 @@
           <a:p>
             <a:fld id="{5A70A388-5CB4-42F2-85B9-1AE1F63398FA}" type="datetime8">
               <a:rPr lang="en-US" smtClean="0"/>
-              <a:t>1/27/2019 4:51 PM</a:t>
+              <a:t>2/4/2019 8:48 AM</a:t>
             </a:fld>
             <a:endParaRPr lang="en-US" dirty="0"/>
           </a:p>
@@ -5777,7 +5853,7 @@
           <a:p>
             <a:fld id="{6939CF7E-134C-4B4A-9853-17D7568CBCC2}" type="datetime8">
               <a:rPr lang="en-US" smtClean="0"/>
-              <a:t>1/27/2019 4:51 PM</a:t>
+              <a:t>2/4/2019 8:48 AM</a:t>
             </a:fld>
             <a:endParaRPr lang="en-US" dirty="0"/>
           </a:p>
@@ -6039,7 +6115,7 @@
           <a:p>
             <a:fld id="{B76134C8-AC9E-49DD-B3D6-722B1A93F18D}" type="datetime8">
               <a:rPr lang="en-US" smtClean="0"/>
-              <a:t>1/27/2019 4:51 PM</a:t>
+              <a:t>2/4/2019 8:48 AM</a:t>
             </a:fld>
             <a:endParaRPr lang="en-US" dirty="0"/>
           </a:p>
@@ -6220,7 +6296,7 @@
           <a:p>
             <a:fld id="{34FAA446-E61B-4D43-A3B1-7749AA6DC131}" type="datetime8">
               <a:rPr lang="en-US" smtClean="0"/>
-              <a:t>1/27/2019 4:51 PM</a:t>
+              <a:t>2/4/2019 8:48 AM</a:t>
             </a:fld>
             <a:endParaRPr lang="en-US" dirty="0"/>
           </a:p>
@@ -6401,7 +6477,7 @@
           <a:p>
             <a:fld id="{F86059B6-667D-4F24-AA48-46C1EA5D9E8E}" type="datetime8">
               <a:rPr lang="en-US" smtClean="0"/>
-              <a:t>1/27/2019 4:51 PM</a:t>
+              <a:t>2/4/2019 8:48 AM</a:t>
             </a:fld>
             <a:endParaRPr lang="en-US" dirty="0"/>
           </a:p>
@@ -6666,7 +6742,7 @@
           <a:p>
             <a:fld id="{35A2D088-BDBD-41A5-ADCE-5C6A4DC08057}" type="datetime8">
               <a:rPr lang="en-US" smtClean="0"/>
-              <a:t>1/27/2019 4:51 PM</a:t>
+              <a:t>2/4/2019 8:48 AM</a:t>
             </a:fld>
             <a:endParaRPr lang="en-US" dirty="0"/>
           </a:p>
@@ -6798,7 +6874,7 @@
           <a:p>
             <a:fld id="{174E4CE6-2FE4-433F-87B8-CB5DD266EBFC}" type="datetime8">
               <a:rPr lang="en-US" smtClean="0"/>
-              <a:t>1/27/2019 4:51 PM</a:t>
+              <a:t>2/4/2019 8:48 AM</a:t>
             </a:fld>
             <a:endParaRPr lang="en-US" dirty="0"/>
           </a:p>
@@ -6997,7 +7073,7 @@
                   <a:prstClr val="black"/>
                 </a:solidFill>
               </a:rPr>
-              <a:t>1/27/2019 4:51 PM</a:t>
+              <a:t>2/4/2019 8:48 AM</a:t>
             </a:fld>
             <a:endParaRPr lang="en-US" dirty="0">
               <a:solidFill>
@@ -20428,7 +20504,7 @@
                 <a:latin typeface="Segoe UI Semilight" panose="020B0402040204020203" pitchFamily="34" charset="0"/>
                 <a:cs typeface="Segoe UI Semilight" panose="020B0402040204020203" pitchFamily="34" charset="0"/>
               </a:rPr>
-              <a:t>We are concerned about how much it costs to use Cosmos DB for our solution. What is the real value in using this service?</a:t>
+              <a:t>We are concerned about how much it costs to use Cosmos DB for our solution. What is the real value of the service, and how do we set up Cosmos DB in an optimal way?</a:t>
             </a:r>
           </a:p>
           <a:p>
@@ -21977,8 +22053,8 @@
         </p:blipFill>
         <p:spPr>
           <a:xfrm>
-            <a:off x="1117495" y="988942"/>
-            <a:ext cx="9957009" cy="5779606"/>
+            <a:off x="1117495" y="992185"/>
+            <a:ext cx="9957009" cy="5773119"/>
           </a:xfrm>
           <a:prstGeom prst="rect">
             <a:avLst/>
@@ -34152,7 +34228,7 @@
         </p:spPr>
         <p:txBody>
           <a:bodyPr>
-            <a:normAutofit/>
+            <a:normAutofit lnSpcReduction="10000"/>
           </a:bodyPr>
           <a:lstStyle/>
           <a:p>
@@ -34207,7 +34283,28 @@
                 <a:ea typeface="Segoe UI" panose="020B0502040204020203" pitchFamily="34" charset="0"/>
                 <a:cs typeface="Segoe UI Light" panose="020B0502040204020203" pitchFamily="34" charset="0"/>
               </a:rPr>
-              <a:t>using this service?</a:t>
+              <a:t>using this service, and how do we set up Cosmos DB in</a:t>
+            </a:r>
+            <a:br>
+              <a:rPr lang="en-US" sz="3200" dirty="0">
+                <a:solidFill>
+                  <a:schemeClr val="tx1"/>
+                </a:solidFill>
+                <a:latin typeface="Segoe UI Light" panose="020B0502040204020203" pitchFamily="34" charset="0"/>
+                <a:ea typeface="Segoe UI" panose="020B0502040204020203" pitchFamily="34" charset="0"/>
+                <a:cs typeface="Segoe UI Light" panose="020B0502040204020203" pitchFamily="34" charset="0"/>
+              </a:rPr>
+            </a:br>
+            <a:r>
+              <a:rPr lang="en-US" sz="3200" dirty="0">
+                <a:solidFill>
+                  <a:schemeClr val="tx1"/>
+                </a:solidFill>
+                <a:latin typeface="Segoe UI Light" panose="020B0502040204020203" pitchFamily="34" charset="0"/>
+                <a:ea typeface="Segoe UI" panose="020B0502040204020203" pitchFamily="34" charset="0"/>
+                <a:cs typeface="Segoe UI Light" panose="020B0502040204020203" pitchFamily="34" charset="0"/>
+              </a:rPr>
+              <a:t>an optimal way?</a:t>
             </a:r>
           </a:p>
           <a:p>
@@ -38521,6 +38618,15 @@
 </file>
 
 <file path=customXml/item1.xml><?xml version="1.0" encoding="utf-8"?>
+<?mso-contentType ?>
+<FormTemplates xmlns="http://schemas.microsoft.com/sharepoint/v3/contenttype/forms">
+  <Display>DocumentLibraryForm</Display>
+  <Edit>DocumentLibraryForm</Edit>
+  <New>DocumentLibraryForm</New>
+</FormTemplates>
+</file>
+
+<file path=customXml/item2.xml><?xml version="1.0" encoding="utf-8"?>
 <ct:contentTypeSchema xmlns:ct="http://schemas.microsoft.com/office/2006/metadata/contentType" xmlns:ma="http://schemas.microsoft.com/office/2006/metadata/properties/metaAttributes" ct:_="" ma:_="" ma:contentTypeName="Document" ma:contentTypeID="0x010100D15DFA3690A15B4081582BBCC6BEAC3E" ma:contentTypeVersion="9" ma:contentTypeDescription="Create a new document." ma:contentTypeScope="" ma:versionID="642da1784587cbe85a7fdbbe4dc36103">
   <xsd:schema xmlns:xsd="http://www.w3.org/2001/XMLSchema" xmlns:xs="http://www.w3.org/2001/XMLSchema" xmlns:p="http://schemas.microsoft.com/office/2006/metadata/properties" xmlns:ns1="http://schemas.microsoft.com/sharepoint/v3" xmlns:ns2="2023ac63-7b75-4916-a9ee-591457758eee" xmlns:ns3="d9c797ad-d7c3-4982-82b7-81352a75e4a5" targetNamespace="http://schemas.microsoft.com/office/2006/metadata/properties" ma:root="true" ma:fieldsID="91198b0246576053cc55dd2c67035a89" ns1:_="" ns2:_="" ns3:_="">
     <xsd:import namespace="http://schemas.microsoft.com/sharepoint/v3"/>
@@ -38722,15 +38828,6 @@
 </ct:contentTypeSchema>
 </file>
 
-<file path=customXml/item2.xml><?xml version="1.0" encoding="utf-8"?>
-<?mso-contentType ?>
-<FormTemplates xmlns="http://schemas.microsoft.com/sharepoint/v3/contenttype/forms">
-  <Display>DocumentLibraryForm</Display>
-  <Edit>DocumentLibraryForm</Edit>
-  <New>DocumentLibraryForm</New>
-</FormTemplates>
-</file>
-
 <file path=customXml/item3.xml><?xml version="1.0" encoding="utf-8"?>
 <p:properties xmlns:p="http://schemas.microsoft.com/office/2006/metadata/properties" xmlns:xsi="http://www.w3.org/2001/XMLSchema-instance" xmlns:pc="http://schemas.microsoft.com/office/infopath/2007/PartnerControls">
   <documentManagement>
@@ -38741,6 +38838,14 @@
 </file>
 
 <file path=customXml/itemProps1.xml><?xml version="1.0" encoding="utf-8"?>
+<ds:datastoreItem xmlns:ds="http://schemas.openxmlformats.org/officeDocument/2006/customXml" ds:itemID="{F18501AF-04CF-4482-BAE1-607B49DDC378}">
+  <ds:schemaRefs>
+    <ds:schemaRef ds:uri="http://schemas.microsoft.com/sharepoint/v3/contenttype/forms"/>
+  </ds:schemaRefs>
+</ds:datastoreItem>
+</file>
+
+<file path=customXml/itemProps2.xml><?xml version="1.0" encoding="utf-8"?>
 <ds:datastoreItem xmlns:ds="http://schemas.openxmlformats.org/officeDocument/2006/customXml" ds:itemID="{255F5BEB-6AD6-480A-8556-C80C5EBC10F2}">
   <ds:schemaRefs>
     <ds:schemaRef ds:uri="http://schemas.microsoft.com/office/2006/metadata/contentType"/>
@@ -38756,14 +38861,6 @@
     <ds:schemaRef ds:uri="http://purl.org/dc/elements/1.1/"/>
     <ds:schemaRef ds:uri="http://purl.org/dc/terms/"/>
     <ds:schemaRef ds:uri="http://schemas.microsoft.com/internal/obd"/>
-  </ds:schemaRefs>
-</ds:datastoreItem>
-</file>
-
-<file path=customXml/itemProps2.xml><?xml version="1.0" encoding="utf-8"?>
-<ds:datastoreItem xmlns:ds="http://schemas.openxmlformats.org/officeDocument/2006/customXml" ds:itemID="{F18501AF-04CF-4482-BAE1-607B49DDC378}">
-  <ds:schemaRefs>
-    <ds:schemaRef ds:uri="http://schemas.microsoft.com/sharepoint/v3/contenttype/forms"/>
   </ds:schemaRefs>
 </ds:datastoreItem>
 </file>

</xml_diff>

<commit_message>
Updated alt-text on images in PPTX
</commit_message>
<xml_diff>
--- a/Whiteboard design session/WDS trainer presentation - Cosmos DB Real Time Advanced Analytics.pptx
+++ b/Whiteboard design session/WDS trainer presentation - Cosmos DB Real Time Advanced Analytics.pptx
@@ -1,46 +1,46 @@
 
 <file path=ppt/presentation.xml><?xml version="1.0" encoding="utf-8"?>
-<p:presentation xmlns:a="http://schemas.openxmlformats.org/drawingml/2006/main" xmlns:r="http://schemas.openxmlformats.org/officeDocument/2006/relationships" xmlns:p="http://schemas.openxmlformats.org/presentationml/2006/main" saveSubsetFonts="1">
+<p:presentation xmlns:a="http://schemas.openxmlformats.org/drawingml/2006/main" xmlns:r="http://schemas.openxmlformats.org/officeDocument/2006/relationships" xmlns:p="http://schemas.openxmlformats.org/presentationml/2006/main" removePersonalInfoOnSave="1" saveSubsetFonts="1">
   <p:sldMasterIdLst>
-    <p:sldMasterId id="2147483660" r:id="rId4"/>
-    <p:sldMasterId id="2147483665" r:id="rId5"/>
+    <p:sldMasterId id="2147483660" r:id="rId1"/>
+    <p:sldMasterId id="2147483665" r:id="rId2"/>
   </p:sldMasterIdLst>
   <p:notesMasterIdLst>
-    <p:notesMasterId r:id="rId38"/>
+    <p:notesMasterId r:id="rId35"/>
   </p:notesMasterIdLst>
   <p:sldIdLst>
-    <p:sldId id="300" r:id="rId6"/>
-    <p:sldId id="323" r:id="rId7"/>
-    <p:sldId id="302" r:id="rId8"/>
-    <p:sldId id="259" r:id="rId9"/>
-    <p:sldId id="303" r:id="rId10"/>
-    <p:sldId id="324" r:id="rId11"/>
-    <p:sldId id="325" r:id="rId12"/>
-    <p:sldId id="304" r:id="rId13"/>
-    <p:sldId id="338" r:id="rId14"/>
-    <p:sldId id="305" r:id="rId15"/>
-    <p:sldId id="320" r:id="rId16"/>
-    <p:sldId id="322" r:id="rId17"/>
-    <p:sldId id="321" r:id="rId18"/>
-    <p:sldId id="317" r:id="rId19"/>
-    <p:sldId id="316" r:id="rId20"/>
-    <p:sldId id="326" r:id="rId21"/>
-    <p:sldId id="327" r:id="rId22"/>
-    <p:sldId id="328" r:id="rId23"/>
-    <p:sldId id="329" r:id="rId24"/>
-    <p:sldId id="330" r:id="rId25"/>
-    <p:sldId id="331" r:id="rId26"/>
-    <p:sldId id="332" r:id="rId27"/>
-    <p:sldId id="333" r:id="rId28"/>
-    <p:sldId id="334" r:id="rId29"/>
-    <p:sldId id="335" r:id="rId30"/>
-    <p:sldId id="340" r:id="rId31"/>
-    <p:sldId id="319" r:id="rId32"/>
-    <p:sldId id="336" r:id="rId33"/>
-    <p:sldId id="337" r:id="rId34"/>
-    <p:sldId id="339" r:id="rId35"/>
-    <p:sldId id="318" r:id="rId36"/>
-    <p:sldId id="315" r:id="rId37"/>
+    <p:sldId id="300" r:id="rId3"/>
+    <p:sldId id="323" r:id="rId4"/>
+    <p:sldId id="302" r:id="rId5"/>
+    <p:sldId id="259" r:id="rId6"/>
+    <p:sldId id="303" r:id="rId7"/>
+    <p:sldId id="324" r:id="rId8"/>
+    <p:sldId id="325" r:id="rId9"/>
+    <p:sldId id="304" r:id="rId10"/>
+    <p:sldId id="338" r:id="rId11"/>
+    <p:sldId id="305" r:id="rId12"/>
+    <p:sldId id="320" r:id="rId13"/>
+    <p:sldId id="322" r:id="rId14"/>
+    <p:sldId id="321" r:id="rId15"/>
+    <p:sldId id="317" r:id="rId16"/>
+    <p:sldId id="316" r:id="rId17"/>
+    <p:sldId id="326" r:id="rId18"/>
+    <p:sldId id="327" r:id="rId19"/>
+    <p:sldId id="328" r:id="rId20"/>
+    <p:sldId id="329" r:id="rId21"/>
+    <p:sldId id="330" r:id="rId22"/>
+    <p:sldId id="331" r:id="rId23"/>
+    <p:sldId id="332" r:id="rId24"/>
+    <p:sldId id="333" r:id="rId25"/>
+    <p:sldId id="334" r:id="rId26"/>
+    <p:sldId id="335" r:id="rId27"/>
+    <p:sldId id="340" r:id="rId28"/>
+    <p:sldId id="319" r:id="rId29"/>
+    <p:sldId id="336" r:id="rId30"/>
+    <p:sldId id="337" r:id="rId31"/>
+    <p:sldId id="339" r:id="rId32"/>
+    <p:sldId id="318" r:id="rId33"/>
+    <p:sldId id="315" r:id="rId34"/>
   </p:sldIdLst>
   <p:sldSz cx="12192000" cy="6858000"/>
   <p:notesSz cx="6858000" cy="9144000"/>
@@ -238,7 +238,7 @@
           <a:p>
             <a:fld id="{52A13B17-C506-4D51-BB37-16B365906619}" type="datetimeFigureOut">
               <a:rPr lang="en-US" smtClean="0"/>
-              <a:t>3/7/2019</a:t>
+              <a:t>3/19/2019</a:t>
             </a:fld>
             <a:endParaRPr lang="en-US" dirty="0"/>
           </a:p>
@@ -4472,7 +4472,7 @@
                   <a:prstClr val="black"/>
                 </a:solidFill>
               </a:rPr>
-              <a:t>3/7/2019 12:09 PM</a:t>
+              <a:t>3/19/2019 8:26 AM</a:t>
             </a:fld>
             <a:endParaRPr lang="en-US" dirty="0">
               <a:solidFill>
@@ -17516,7 +17516,7 @@
       </p:sp>
       <p:pic>
         <p:nvPicPr>
-          <p:cNvPr id="4" name="Picture 3">
+          <p:cNvPr id="4" name="Picture 3" descr="Diagram of common scenarios using Azure Cosmos DB. Streaming events are used as a data source and ingested into Cosmos DB. Data is prepared and analyzed using Azure Databricks and Azure ML, then served through Cosmos DB and presented using Power BI Dashboards.">
             <a:extLst>
               <a:ext uri="{FF2B5EF4-FFF2-40B4-BE49-F238E27FC236}">
                 <a16:creationId xmlns:a16="http://schemas.microsoft.com/office/drawing/2014/main" id="{FBE1216C-A00A-431B-BE38-1A55F1A057DA}"/>
@@ -18759,7 +18759,7 @@
       </p:sp>
       <p:pic>
         <p:nvPicPr>
-          <p:cNvPr id="7" name="Graphic 6" descr="Decorative image" title="Meeting icon">
+          <p:cNvPr id="7" name="Graphic 6" descr="Meeting icon">
             <a:extLst>
               <a:ext uri="{FF2B5EF4-FFF2-40B4-BE49-F238E27FC236}">
                 <a16:creationId xmlns:a16="http://schemas.microsoft.com/office/drawing/2014/main" id="{5EEAC033-463F-41E9-A481-7B1D19604BBB}"/>
@@ -18879,7 +18879,7 @@
       </p:sp>
       <p:pic>
         <p:nvPicPr>
-          <p:cNvPr id="6" name="Picture 5">
+          <p:cNvPr id="6" name="Picture 5" descr="The preferred solution diagram shows streaming events being ingested into Cosmos DB via Event Hubs. Data is prepared and analyzed using Azure Databricks, then served through Cosmos DB and presented using Power BI Dashboards.">
             <a:extLst>
               <a:ext uri="{FF2B5EF4-FFF2-40B4-BE49-F238E27FC236}">
                 <a16:creationId xmlns:a16="http://schemas.microsoft.com/office/drawing/2014/main" id="{7BBFBDF1-5E6E-4E0D-B9EF-D4FC681F8DA9}"/>
@@ -19115,7 +19115,7 @@
       </p:sp>
       <p:pic>
         <p:nvPicPr>
-          <p:cNvPr id="16" name="Picture 15" descr="Database" title="Database">
+          <p:cNvPr id="16" name="Picture 15" descr="Document Database icon">
             <a:extLst>
               <a:ext uri="{FF2B5EF4-FFF2-40B4-BE49-F238E27FC236}">
                 <a16:creationId xmlns:a16="http://schemas.microsoft.com/office/drawing/2014/main" id="{3480198F-CCBB-4F09-B649-3DEB43376521}"/>
@@ -19152,7 +19152,7 @@
       </p:pic>
       <p:pic>
         <p:nvPicPr>
-          <p:cNvPr id="5" name="Graphic 4" descr="Earth Globe Americas">
+          <p:cNvPr id="5" name="Graphic 4" descr="Globe icon">
             <a:extLst>
               <a:ext uri="{FF2B5EF4-FFF2-40B4-BE49-F238E27FC236}">
                 <a16:creationId xmlns:a16="http://schemas.microsoft.com/office/drawing/2014/main" id="{574ED60D-80C1-437D-B88E-817EF35A158A}"/>
@@ -19191,7 +19191,7 @@
       </p:pic>
       <p:pic>
         <p:nvPicPr>
-          <p:cNvPr id="7" name="Graphic 6" descr="Gauge">
+          <p:cNvPr id="7" name="Graphic 6" descr="Gauge icon">
             <a:extLst>
               <a:ext uri="{FF2B5EF4-FFF2-40B4-BE49-F238E27FC236}">
                 <a16:creationId xmlns:a16="http://schemas.microsoft.com/office/drawing/2014/main" id="{DF36436B-E4B7-4DA5-878F-25E07CD2381F}"/>
@@ -19417,7 +19417,7 @@
       </p:sp>
       <p:pic>
         <p:nvPicPr>
-          <p:cNvPr id="9" name="Picture 8" descr="Database" title="Database">
+          <p:cNvPr id="9" name="Picture 8" descr="Document Database icon">
             <a:extLst>
               <a:ext uri="{FF2B5EF4-FFF2-40B4-BE49-F238E27FC236}">
                 <a16:creationId xmlns:a16="http://schemas.microsoft.com/office/drawing/2014/main" id="{8E556BBA-CF4A-41BA-9ACE-1BC32A1702B0}"/>
@@ -19454,7 +19454,7 @@
       </p:pic>
       <p:pic>
         <p:nvPicPr>
-          <p:cNvPr id="10" name="Graphic 9" descr="Earth Globe Americas">
+          <p:cNvPr id="10" name="Graphic 9" descr="Globe icon">
             <a:extLst>
               <a:ext uri="{FF2B5EF4-FFF2-40B4-BE49-F238E27FC236}">
                 <a16:creationId xmlns:a16="http://schemas.microsoft.com/office/drawing/2014/main" id="{5420517E-6452-45DC-B8C7-BCA1E8B257E5}"/>
@@ -19493,7 +19493,7 @@
       </p:pic>
       <p:pic>
         <p:nvPicPr>
-          <p:cNvPr id="12" name="Graphic 11" descr="Gauge">
+          <p:cNvPr id="12" name="Graphic 11" descr="Gauge icon">
             <a:extLst>
               <a:ext uri="{FF2B5EF4-FFF2-40B4-BE49-F238E27FC236}">
                 <a16:creationId xmlns:a16="http://schemas.microsoft.com/office/drawing/2014/main" id="{280D9E88-6B4D-4399-97FC-2E040ED4B148}"/>
@@ -19732,7 +19732,7 @@
       </p:sp>
       <p:pic>
         <p:nvPicPr>
-          <p:cNvPr id="11" name="Graphic 10" descr="Download from cloud">
+          <p:cNvPr id="11" name="Graphic 10" descr="Download from cloud icon">
             <a:extLst>
               <a:ext uri="{FF2B5EF4-FFF2-40B4-BE49-F238E27FC236}">
                 <a16:creationId xmlns:a16="http://schemas.microsoft.com/office/drawing/2014/main" id="{2E2BE4C3-BEE6-4981-A018-0FBDC0EEB7F7}"/>
@@ -19771,7 +19771,7 @@
       </p:pic>
       <p:pic>
         <p:nvPicPr>
-          <p:cNvPr id="13" name="Graphic 12" descr="Database">
+          <p:cNvPr id="13" name="Graphic 12" descr="Database icon">
             <a:extLst>
               <a:ext uri="{FF2B5EF4-FFF2-40B4-BE49-F238E27FC236}">
                 <a16:creationId xmlns:a16="http://schemas.microsoft.com/office/drawing/2014/main" id="{DC33B96B-A6EE-48E2-9B11-B91507CFC385}"/>
@@ -20010,7 +20010,7 @@
       </p:sp>
       <p:pic>
         <p:nvPicPr>
-          <p:cNvPr id="7" name="Graphic 6" descr="Download from cloud">
+          <p:cNvPr id="7" name="Graphic 6" descr="Download from cloud icon">
             <a:extLst>
               <a:ext uri="{FF2B5EF4-FFF2-40B4-BE49-F238E27FC236}">
                 <a16:creationId xmlns:a16="http://schemas.microsoft.com/office/drawing/2014/main" id="{C3229484-55B5-48EE-B99C-AB478A4EB785}"/>
@@ -20049,7 +20049,7 @@
       </p:pic>
       <p:pic>
         <p:nvPicPr>
-          <p:cNvPr id="8" name="Graphic 7" descr="Database">
+          <p:cNvPr id="8" name="Graphic 7" descr="Database icon">
             <a:extLst>
               <a:ext uri="{FF2B5EF4-FFF2-40B4-BE49-F238E27FC236}">
                 <a16:creationId xmlns:a16="http://schemas.microsoft.com/office/drawing/2014/main" id="{B0CAA031-5F71-4E43-A7ED-C4FE18E45028}"/>
@@ -20164,7 +20164,7 @@
       </p:sp>
       <p:pic>
         <p:nvPicPr>
-          <p:cNvPr id="4" name="Graphic 3" descr="Teacher icon" title="Teacher icon">
+          <p:cNvPr id="4" name="Graphic 3" descr="Teacher icon">
             <a:extLst>
               <a:ext uri="{FF2B5EF4-FFF2-40B4-BE49-F238E27FC236}">
                 <a16:creationId xmlns:a16="http://schemas.microsoft.com/office/drawing/2014/main" id="{9C3F82EB-6551-4435-B752-1DF4ADF2E21E}"/>
@@ -20502,7 +20502,7 @@
       </p:sp>
       <p:pic>
         <p:nvPicPr>
-          <p:cNvPr id="5" name="Picture 4">
+          <p:cNvPr id="5" name="Picture 4" descr="Databricks logo">
             <a:extLst>
               <a:ext uri="{FF2B5EF4-FFF2-40B4-BE49-F238E27FC236}">
                 <a16:creationId xmlns:a16="http://schemas.microsoft.com/office/drawing/2014/main" id="{37EBAA59-7347-4383-868D-EDB3969B9938}"/>
@@ -20804,7 +20804,7 @@
       </p:sp>
       <p:pic>
         <p:nvPicPr>
-          <p:cNvPr id="5" name="Picture 4">
+          <p:cNvPr id="5" name="Picture 4" descr="Databricks logo">
             <a:extLst>
               <a:ext uri="{FF2B5EF4-FFF2-40B4-BE49-F238E27FC236}">
                 <a16:creationId xmlns:a16="http://schemas.microsoft.com/office/drawing/2014/main" id="{37EBAA59-7347-4383-868D-EDB3969B9938}"/>
@@ -21047,7 +21047,7 @@
       </p:sp>
       <p:pic>
         <p:nvPicPr>
-          <p:cNvPr id="5" name="Picture 4">
+          <p:cNvPr id="5" name="Picture 4" descr="Databricks logo">
             <a:extLst>
               <a:ext uri="{FF2B5EF4-FFF2-40B4-BE49-F238E27FC236}">
                 <a16:creationId xmlns:a16="http://schemas.microsoft.com/office/drawing/2014/main" id="{37EBAA59-7347-4383-868D-EDB3969B9938}"/>
@@ -21083,7 +21083,7 @@
       </p:pic>
       <p:pic>
         <p:nvPicPr>
-          <p:cNvPr id="6" name="Picture 5">
+          <p:cNvPr id="6" name="Picture 5" descr="Azure Key Vault logo">
             <a:extLst>
               <a:ext uri="{FF2B5EF4-FFF2-40B4-BE49-F238E27FC236}">
                 <a16:creationId xmlns:a16="http://schemas.microsoft.com/office/drawing/2014/main" id="{65C9088F-FEF0-4E2B-9D7F-A536323D25AD}"/>
@@ -21339,7 +21339,7 @@
       </p:sp>
       <p:pic>
         <p:nvPicPr>
-          <p:cNvPr id="5" name="Picture 4">
+          <p:cNvPr id="5" name="Picture 4" descr="Databricks logo">
             <a:extLst>
               <a:ext uri="{FF2B5EF4-FFF2-40B4-BE49-F238E27FC236}">
                 <a16:creationId xmlns:a16="http://schemas.microsoft.com/office/drawing/2014/main" id="{37EBAA59-7347-4383-868D-EDB3969B9938}"/>
@@ -21621,7 +21621,7 @@
       </p:sp>
       <p:pic>
         <p:nvPicPr>
-          <p:cNvPr id="5" name="Picture 4">
+          <p:cNvPr id="5" name="Picture 4" descr="Databricks logo">
             <a:extLst>
               <a:ext uri="{FF2B5EF4-FFF2-40B4-BE49-F238E27FC236}">
                 <a16:creationId xmlns:a16="http://schemas.microsoft.com/office/drawing/2014/main" id="{37EBAA59-7347-4383-868D-EDB3969B9938}"/>
@@ -21657,7 +21657,7 @@
       </p:pic>
       <p:pic>
         <p:nvPicPr>
-          <p:cNvPr id="6" name="Graphic 5" descr="Brain">
+          <p:cNvPr id="6" name="Graphic 5" descr="Brain icon">
             <a:extLst>
               <a:ext uri="{FF2B5EF4-FFF2-40B4-BE49-F238E27FC236}">
                 <a16:creationId xmlns:a16="http://schemas.microsoft.com/office/drawing/2014/main" id="{6A94AC2D-6DEC-46CC-BE49-E8E07EC2F9C7}"/>
@@ -21696,7 +21696,7 @@
       </p:pic>
       <p:pic>
         <p:nvPicPr>
-          <p:cNvPr id="8" name="Graphic 7" descr="Flask">
+          <p:cNvPr id="8" name="Graphic 7" descr="Azure Machine Learning icon">
             <a:extLst>
               <a:ext uri="{FF2B5EF4-FFF2-40B4-BE49-F238E27FC236}">
                 <a16:creationId xmlns:a16="http://schemas.microsoft.com/office/drawing/2014/main" id="{8506511A-115F-4395-82D5-46DF71FABEF4}"/>
@@ -21949,7 +21949,7 @@
       </p:sp>
       <p:pic>
         <p:nvPicPr>
-          <p:cNvPr id="5" name="Picture 4">
+          <p:cNvPr id="5" name="Picture 4" descr="Databricks logo">
             <a:extLst>
               <a:ext uri="{FF2B5EF4-FFF2-40B4-BE49-F238E27FC236}">
                 <a16:creationId xmlns:a16="http://schemas.microsoft.com/office/drawing/2014/main" id="{37EBAA59-7347-4383-868D-EDB3969B9938}"/>
@@ -21985,7 +21985,7 @@
       </p:pic>
       <p:pic>
         <p:nvPicPr>
-          <p:cNvPr id="7" name="Picture 6" descr="A close up of a logo&#10;&#10;Description automatically generated">
+          <p:cNvPr id="7" name="Picture 6" descr="Power BI logo">
             <a:extLst>
               <a:ext uri="{FF2B5EF4-FFF2-40B4-BE49-F238E27FC236}">
                 <a16:creationId xmlns:a16="http://schemas.microsoft.com/office/drawing/2014/main" id="{9040D8A2-5E71-48F8-AC13-EEA57DDB228A}"/>
@@ -22203,7 +22203,7 @@
       </p:sp>
       <p:pic>
         <p:nvPicPr>
-          <p:cNvPr id="7" name="Picture 6" descr="A close up of a logo&#10;&#10;Description automatically generated">
+          <p:cNvPr id="7" name="Picture 6" descr="Power BI logo">
             <a:extLst>
               <a:ext uri="{FF2B5EF4-FFF2-40B4-BE49-F238E27FC236}">
                 <a16:creationId xmlns:a16="http://schemas.microsoft.com/office/drawing/2014/main" id="{9040D8A2-5E71-48F8-AC13-EEA57DDB228A}"/>
@@ -22240,7 +22240,7 @@
       </p:pic>
       <p:pic>
         <p:nvPicPr>
-          <p:cNvPr id="6" name="Picture 5" descr="A picture containing object&#10;&#10;Description automatically generated">
+          <p:cNvPr id="6" name="Picture 5" descr="Analysis Services logo">
             <a:extLst>
               <a:ext uri="{FF2B5EF4-FFF2-40B4-BE49-F238E27FC236}">
                 <a16:creationId xmlns:a16="http://schemas.microsoft.com/office/drawing/2014/main" id="{6736AFB8-2C5F-465C-872A-1606F7557841}"/>
@@ -24293,7 +24293,7 @@
       </p:sp>
       <p:pic>
         <p:nvPicPr>
-          <p:cNvPr id="8" name="Graphic 7" descr="Earth Globe Americas">
+          <p:cNvPr id="8" name="Graphic 7" descr="Globe icon">
             <a:extLst>
               <a:ext uri="{FF2B5EF4-FFF2-40B4-BE49-F238E27FC236}">
                 <a16:creationId xmlns:a16="http://schemas.microsoft.com/office/drawing/2014/main" id="{84614F9B-5D2D-43AB-BBBB-4E31E1ADDB76}"/>
@@ -24332,7 +24332,7 @@
       </p:pic>
       <p:pic>
         <p:nvPicPr>
-          <p:cNvPr id="10" name="Graphic 9" descr="Brain">
+          <p:cNvPr id="10" name="Graphic 9" descr="Brain icon">
             <a:extLst>
               <a:ext uri="{FF2B5EF4-FFF2-40B4-BE49-F238E27FC236}">
                 <a16:creationId xmlns:a16="http://schemas.microsoft.com/office/drawing/2014/main" id="{0EFED397-9BFC-4141-8DAB-3806FCDE8B36}"/>
@@ -24744,7 +24744,7 @@
       </p:sp>
       <p:pic>
         <p:nvPicPr>
-          <p:cNvPr id="4" name="Graphic 3" descr="Flask">
+          <p:cNvPr id="4" name="Graphic 3" descr="Azure Machine Learning icon">
             <a:extLst>
               <a:ext uri="{FF2B5EF4-FFF2-40B4-BE49-F238E27FC236}">
                 <a16:creationId xmlns:a16="http://schemas.microsoft.com/office/drawing/2014/main" id="{0EB52B4E-6EFA-4220-A9E6-64D7DDE75EB3}"/>
@@ -25355,7 +25355,7 @@
       </p:sp>
       <p:pic>
         <p:nvPicPr>
-          <p:cNvPr id="7" name="Graphic 6" descr="Question icon" title="Question icon">
+          <p:cNvPr id="7" name="Graphic 6" descr="Question icon">
             <a:extLst>
               <a:ext uri="{FF2B5EF4-FFF2-40B4-BE49-F238E27FC236}">
                 <a16:creationId xmlns:a16="http://schemas.microsoft.com/office/drawing/2014/main" id="{7B1DE207-BA33-41B2-8AE1-49942EF5B175}"/>
@@ -25530,7 +25530,7 @@
       </p:sp>
       <p:pic>
         <p:nvPicPr>
-          <p:cNvPr id="7" name="Graphic 6" descr="Question icon" title="Question icon">
+          <p:cNvPr id="7" name="Graphic 6" descr="Question icon">
             <a:extLst>
               <a:ext uri="{FF2B5EF4-FFF2-40B4-BE49-F238E27FC236}">
                 <a16:creationId xmlns:a16="http://schemas.microsoft.com/office/drawing/2014/main" id="{7B1DE207-BA33-41B2-8AE1-49942EF5B175}"/>
@@ -26451,270 +26451,4 @@
     </a:ext>
   </a:extLst>
 </a:theme>
-</file>
-
-<file path=customXml/item1.xml><?xml version="1.0" encoding="utf-8"?>
-<p:properties xmlns:p="http://schemas.microsoft.com/office/2006/metadata/properties" xmlns:xsi="http://www.w3.org/2001/XMLSchema-instance" xmlns:pc="http://schemas.microsoft.com/office/infopath/2007/PartnerControls">
-  <documentManagement>
-    <_ip_UnifiedCompliancePolicyUIAction xmlns="http://schemas.microsoft.com/sharepoint/v3" xsi:nil="true"/>
-    <_ip_UnifiedCompliancePolicyProperties xmlns="http://schemas.microsoft.com/sharepoint/v3" xsi:nil="true"/>
-  </documentManagement>
-</p:properties>
-</file>
-
-<file path=customXml/item2.xml><?xml version="1.0" encoding="utf-8"?>
-<?mso-contentType ?>
-<FormTemplates xmlns="http://schemas.microsoft.com/sharepoint/v3/contenttype/forms">
-  <Display>DocumentLibraryForm</Display>
-  <Edit>DocumentLibraryForm</Edit>
-  <New>DocumentLibraryForm</New>
-</FormTemplates>
-</file>
-
-<file path=customXml/item3.xml><?xml version="1.0" encoding="utf-8"?>
-<ct:contentTypeSchema xmlns:ct="http://schemas.microsoft.com/office/2006/metadata/contentType" xmlns:ma="http://schemas.microsoft.com/office/2006/metadata/properties/metaAttributes" ct:_="" ma:_="" ma:contentTypeName="Document" ma:contentTypeID="0x010100D15DFA3690A15B4081582BBCC6BEAC3E" ma:contentTypeVersion="9" ma:contentTypeDescription="Create a new document." ma:contentTypeScope="" ma:versionID="642da1784587cbe85a7fdbbe4dc36103">
-  <xsd:schema xmlns:xsd="http://www.w3.org/2001/XMLSchema" xmlns:xs="http://www.w3.org/2001/XMLSchema" xmlns:p="http://schemas.microsoft.com/office/2006/metadata/properties" xmlns:ns1="http://schemas.microsoft.com/sharepoint/v3" xmlns:ns2="2023ac63-7b75-4916-a9ee-591457758eee" xmlns:ns3="d9c797ad-d7c3-4982-82b7-81352a75e4a5" targetNamespace="http://schemas.microsoft.com/office/2006/metadata/properties" ma:root="true" ma:fieldsID="91198b0246576053cc55dd2c67035a89" ns1:_="" ns2:_="" ns3:_="">
-    <xsd:import namespace="http://schemas.microsoft.com/sharepoint/v3"/>
-    <xsd:import namespace="2023ac63-7b75-4916-a9ee-591457758eee"/>
-    <xsd:import namespace="d9c797ad-d7c3-4982-82b7-81352a75e4a5"/>
-    <xsd:element name="properties">
-      <xsd:complexType>
-        <xsd:sequence>
-          <xsd:element name="documentManagement">
-            <xsd:complexType>
-              <xsd:all>
-                <xsd:element ref="ns2:SharedWithUsers" minOccurs="0"/>
-                <xsd:element ref="ns2:SharedWithDetails" minOccurs="0"/>
-                <xsd:element ref="ns2:LastSharedByUser" minOccurs="0"/>
-                <xsd:element ref="ns2:LastSharedByTime" minOccurs="0"/>
-                <xsd:element ref="ns3:MediaServiceMetadata" minOccurs="0"/>
-                <xsd:element ref="ns3:MediaServiceFastMetadata" minOccurs="0"/>
-                <xsd:element ref="ns1:_ip_UnifiedCompliancePolicyProperties" minOccurs="0"/>
-                <xsd:element ref="ns1:_ip_UnifiedCompliancePolicyUIAction" minOccurs="0"/>
-                <xsd:element ref="ns3:MediaServiceDateTaken" minOccurs="0"/>
-              </xsd:all>
-            </xsd:complexType>
-          </xsd:element>
-        </xsd:sequence>
-      </xsd:complexType>
-    </xsd:element>
-  </xsd:schema>
-  <xsd:schema xmlns:xsd="http://www.w3.org/2001/XMLSchema" xmlns:xs="http://www.w3.org/2001/XMLSchema" xmlns:dms="http://schemas.microsoft.com/office/2006/documentManagement/types" xmlns:pc="http://schemas.microsoft.com/office/infopath/2007/PartnerControls" targetNamespace="http://schemas.microsoft.com/sharepoint/v3" elementFormDefault="qualified">
-    <xsd:import namespace="http://schemas.microsoft.com/office/2006/documentManagement/types"/>
-    <xsd:import namespace="http://schemas.microsoft.com/office/infopath/2007/PartnerControls"/>
-    <xsd:element name="_ip_UnifiedCompliancePolicyProperties" ma:index="14" nillable="true" ma:displayName="Unified Compliance Policy Properties" ma:description="" ma:hidden="true" ma:internalName="_ip_UnifiedCompliancePolicyProperties">
-      <xsd:simpleType>
-        <xsd:restriction base="dms:Note"/>
-      </xsd:simpleType>
-    </xsd:element>
-    <xsd:element name="_ip_UnifiedCompliancePolicyUIAction" ma:index="15" nillable="true" ma:displayName="Unified Compliance Policy UI Action" ma:description="" ma:hidden="true" ma:internalName="_ip_UnifiedCompliancePolicyUIAction">
-      <xsd:simpleType>
-        <xsd:restriction base="dms:Text"/>
-      </xsd:simpleType>
-    </xsd:element>
-  </xsd:schema>
-  <xsd:schema xmlns:xsd="http://www.w3.org/2001/XMLSchema" xmlns:xs="http://www.w3.org/2001/XMLSchema" xmlns:dms="http://schemas.microsoft.com/office/2006/documentManagement/types" xmlns:pc="http://schemas.microsoft.com/office/infopath/2007/PartnerControls" targetNamespace="2023ac63-7b75-4916-a9ee-591457758eee" elementFormDefault="qualified">
-    <xsd:import namespace="http://schemas.microsoft.com/office/2006/documentManagement/types"/>
-    <xsd:import namespace="http://schemas.microsoft.com/office/infopath/2007/PartnerControls"/>
-    <xsd:element name="SharedWithUsers" ma:index="8" nillable="true" ma:displayName="Shared With" ma:description="" ma:internalName="SharedWithUsers" ma:readOnly="true">
-      <xsd:complexType>
-        <xsd:complexContent>
-          <xsd:extension base="dms:UserMulti">
-            <xsd:sequence>
-              <xsd:element name="UserInfo" minOccurs="0" maxOccurs="unbounded">
-                <xsd:complexType>
-                  <xsd:sequence>
-                    <xsd:element name="DisplayName" type="xsd:string" minOccurs="0"/>
-                    <xsd:element name="AccountId" type="dms:UserId" minOccurs="0" nillable="true"/>
-                    <xsd:element name="AccountType" type="xsd:string" minOccurs="0"/>
-                  </xsd:sequence>
-                </xsd:complexType>
-              </xsd:element>
-            </xsd:sequence>
-          </xsd:extension>
-        </xsd:complexContent>
-      </xsd:complexType>
-    </xsd:element>
-    <xsd:element name="SharedWithDetails" ma:index="9" nillable="true" ma:displayName="Shared With Details" ma:description="" ma:internalName="SharedWithDetails" ma:readOnly="true">
-      <xsd:simpleType>
-        <xsd:restriction base="dms:Note">
-          <xsd:maxLength value="255"/>
-        </xsd:restriction>
-      </xsd:simpleType>
-    </xsd:element>
-    <xsd:element name="LastSharedByUser" ma:index="10" nillable="true" ma:displayName="Last Shared By User" ma:description="" ma:internalName="LastSharedByUser" ma:readOnly="true">
-      <xsd:simpleType>
-        <xsd:restriction base="dms:Note">
-          <xsd:maxLength value="255"/>
-        </xsd:restriction>
-      </xsd:simpleType>
-    </xsd:element>
-    <xsd:element name="LastSharedByTime" ma:index="11" nillable="true" ma:displayName="Last Shared By Time" ma:description="" ma:internalName="LastSharedByTime" ma:readOnly="true">
-      <xsd:simpleType>
-        <xsd:restriction base="dms:DateTime"/>
-      </xsd:simpleType>
-    </xsd:element>
-  </xsd:schema>
-  <xsd:schema xmlns:xsd="http://www.w3.org/2001/XMLSchema" xmlns:xs="http://www.w3.org/2001/XMLSchema" xmlns:dms="http://schemas.microsoft.com/office/2006/documentManagement/types" xmlns:pc="http://schemas.microsoft.com/office/infopath/2007/PartnerControls" targetNamespace="d9c797ad-d7c3-4982-82b7-81352a75e4a5" elementFormDefault="qualified">
-    <xsd:import namespace="http://schemas.microsoft.com/office/2006/documentManagement/types"/>
-    <xsd:import namespace="http://schemas.microsoft.com/office/infopath/2007/PartnerControls"/>
-    <xsd:element name="MediaServiceMetadata" ma:index="12" nillable="true" ma:displayName="MediaServiceMetadata" ma:description="" ma:hidden="true" ma:internalName="MediaServiceMetadata" ma:readOnly="true">
-      <xsd:simpleType>
-        <xsd:restriction base="dms:Note"/>
-      </xsd:simpleType>
-    </xsd:element>
-    <xsd:element name="MediaServiceFastMetadata" ma:index="13" nillable="true" ma:displayName="MediaServiceFastMetadata" ma:description="" ma:hidden="true" ma:internalName="MediaServiceFastMetadata" ma:readOnly="true">
-      <xsd:simpleType>
-        <xsd:restriction base="dms:Note"/>
-      </xsd:simpleType>
-    </xsd:element>
-    <xsd:element name="MediaServiceDateTaken" ma:index="16" nillable="true" ma:displayName="MediaServiceDateTaken" ma:hidden="true" ma:internalName="MediaServiceDateTaken" ma:readOnly="true">
-      <xsd:simpleType>
-        <xsd:restriction base="dms:Text"/>
-      </xsd:simpleType>
-    </xsd:element>
-  </xsd:schema>
-  <xsd:schema xmlns="http://schemas.openxmlformats.org/package/2006/metadata/core-properties" xmlns:xsd="http://www.w3.org/2001/XMLSchema" xmlns:xsi="http://www.w3.org/2001/XMLSchema-instance" xmlns:dc="http://purl.org/dc/elements/1.1/" xmlns:dcterms="http://purl.org/dc/terms/" xmlns:odoc="http://schemas.microsoft.com/internal/obd" targetNamespace="http://schemas.openxmlformats.org/package/2006/metadata/core-properties" elementFormDefault="qualified" attributeFormDefault="unqualified" blockDefault="#all">
-    <xsd:import namespace="http://purl.org/dc/elements/1.1/" schemaLocation="http://dublincore.org/schemas/xmls/qdc/2003/04/02/dc.xsd"/>
-    <xsd:import namespace="http://purl.org/dc/terms/" schemaLocation="http://dublincore.org/schemas/xmls/qdc/2003/04/02/dcterms.xsd"/>
-    <xsd:element name="coreProperties" type="CT_coreProperties"/>
-    <xsd:complexType name="CT_coreProperties">
-      <xsd:all>
-        <xsd:element ref="dc:creator" minOccurs="0" maxOccurs="1"/>
-        <xsd:element ref="dcterms:created" minOccurs="0" maxOccurs="1"/>
-        <xsd:element ref="dc:identifier" minOccurs="0" maxOccurs="1"/>
-        <xsd:element name="contentType" minOccurs="0" maxOccurs="1" type="xsd:string" ma:index="0" ma:displayName="Content Type"/>
-        <xsd:element ref="dc:title" minOccurs="0" maxOccurs="1" ma:index="4" ma:displayName="Title"/>
-        <xsd:element ref="dc:subject" minOccurs="0" maxOccurs="1"/>
-        <xsd:element ref="dc:description" minOccurs="0" maxOccurs="1"/>
-        <xsd:element name="keywords" minOccurs="0" maxOccurs="1" type="xsd:string"/>
-        <xsd:element ref="dc:language" minOccurs="0" maxOccurs="1"/>
-        <xsd:element name="category" minOccurs="0" maxOccurs="1" type="xsd:string"/>
-        <xsd:element name="version" minOccurs="0" maxOccurs="1" type="xsd:string"/>
-        <xsd:element name="revision" minOccurs="0" maxOccurs="1" type="xsd:string">
-          <xsd:annotation>
-            <xsd:documentation>
-                        This value indicates the number of saves or revisions. The application is responsible for updating this value after each revision.
-                    </xsd:documentation>
-          </xsd:annotation>
-        </xsd:element>
-        <xsd:element name="lastModifiedBy" minOccurs="0" maxOccurs="1" type="xsd:string"/>
-        <xsd:element ref="dcterms:modified" minOccurs="0" maxOccurs="1"/>
-        <xsd:element name="contentStatus" minOccurs="0" maxOccurs="1" type="xsd:string"/>
-      </xsd:all>
-    </xsd:complexType>
-  </xsd:schema>
-  <xs:schema xmlns:pc="http://schemas.microsoft.com/office/infopath/2007/PartnerControls" xmlns:xs="http://www.w3.org/2001/XMLSchema" targetNamespace="http://schemas.microsoft.com/office/infopath/2007/PartnerControls" elementFormDefault="qualified" attributeFormDefault="unqualified">
-    <xs:element name="Person">
-      <xs:complexType>
-        <xs:sequence>
-          <xs:element ref="pc:DisplayName" minOccurs="0"/>
-          <xs:element ref="pc:AccountId" minOccurs="0"/>
-          <xs:element ref="pc:AccountType" minOccurs="0"/>
-        </xs:sequence>
-      </xs:complexType>
-    </xs:element>
-    <xs:element name="DisplayName" type="xs:string"/>
-    <xs:element name="AccountId" type="xs:string"/>
-    <xs:element name="AccountType" type="xs:string"/>
-    <xs:element name="BDCAssociatedEntity">
-      <xs:complexType>
-        <xs:sequence>
-          <xs:element ref="pc:BDCEntity" minOccurs="0" maxOccurs="unbounded"/>
-        </xs:sequence>
-        <xs:attribute ref="pc:EntityNamespace"/>
-        <xs:attribute ref="pc:EntityName"/>
-        <xs:attribute ref="pc:SystemInstanceName"/>
-        <xs:attribute ref="pc:AssociationName"/>
-      </xs:complexType>
-    </xs:element>
-    <xs:attribute name="EntityNamespace" type="xs:string"/>
-    <xs:attribute name="EntityName" type="xs:string"/>
-    <xs:attribute name="SystemInstanceName" type="xs:string"/>
-    <xs:attribute name="AssociationName" type="xs:string"/>
-    <xs:element name="BDCEntity">
-      <xs:complexType>
-        <xs:sequence>
-          <xs:element ref="pc:EntityDisplayName" minOccurs="0"/>
-          <xs:element ref="pc:EntityInstanceReference" minOccurs="0"/>
-          <xs:element ref="pc:EntityId1" minOccurs="0"/>
-          <xs:element ref="pc:EntityId2" minOccurs="0"/>
-          <xs:element ref="pc:EntityId3" minOccurs="0"/>
-          <xs:element ref="pc:EntityId4" minOccurs="0"/>
-          <xs:element ref="pc:EntityId5" minOccurs="0"/>
-        </xs:sequence>
-      </xs:complexType>
-    </xs:element>
-    <xs:element name="EntityDisplayName" type="xs:string"/>
-    <xs:element name="EntityInstanceReference" type="xs:string"/>
-    <xs:element name="EntityId1" type="xs:string"/>
-    <xs:element name="EntityId2" type="xs:string"/>
-    <xs:element name="EntityId3" type="xs:string"/>
-    <xs:element name="EntityId4" type="xs:string"/>
-    <xs:element name="EntityId5" type="xs:string"/>
-    <xs:element name="Terms">
-      <xs:complexType>
-        <xs:sequence>
-          <xs:element ref="pc:TermInfo" minOccurs="0" maxOccurs="unbounded"/>
-        </xs:sequence>
-      </xs:complexType>
-    </xs:element>
-    <xs:element name="TermInfo">
-      <xs:complexType>
-        <xs:sequence>
-          <xs:element ref="pc:TermName" minOccurs="0"/>
-          <xs:element ref="pc:TermId" minOccurs="0"/>
-        </xs:sequence>
-      </xs:complexType>
-    </xs:element>
-    <xs:element name="TermName" type="xs:string"/>
-    <xs:element name="TermId" type="xs:string"/>
-  </xs:schema>
-</ct:contentTypeSchema>
-</file>
-
-<file path=customXml/itemProps1.xml><?xml version="1.0" encoding="utf-8"?>
-<ds:datastoreItem xmlns:ds="http://schemas.openxmlformats.org/officeDocument/2006/customXml" ds:itemID="{BAF7D529-36AB-45DA-B239-2F912F2D1610}">
-  <ds:schemaRefs>
-    <ds:schemaRef ds:uri="http://purl.org/dc/elements/1.1/"/>
-    <ds:schemaRef ds:uri="http://schemas.microsoft.com/office/2006/metadata/properties"/>
-    <ds:schemaRef ds:uri="http://purl.org/dc/terms/"/>
-    <ds:schemaRef ds:uri="http://schemas.microsoft.com/office/infopath/2007/PartnerControls"/>
-    <ds:schemaRef ds:uri="http://purl.org/dc/dcmitype/"/>
-    <ds:schemaRef ds:uri="http://schemas.openxmlformats.org/package/2006/metadata/core-properties"/>
-    <ds:schemaRef ds:uri="http://schemas.microsoft.com/office/2006/documentManagement/types"/>
-    <ds:schemaRef ds:uri="d9c797ad-d7c3-4982-82b7-81352a75e4a5"/>
-    <ds:schemaRef ds:uri="2023ac63-7b75-4916-a9ee-591457758eee"/>
-    <ds:schemaRef ds:uri="http://schemas.microsoft.com/sharepoint/v3"/>
-    <ds:schemaRef ds:uri="http://www.w3.org/XML/1998/namespace"/>
-  </ds:schemaRefs>
-</ds:datastoreItem>
-</file>
-
-<file path=customXml/itemProps2.xml><?xml version="1.0" encoding="utf-8"?>
-<ds:datastoreItem xmlns:ds="http://schemas.openxmlformats.org/officeDocument/2006/customXml" ds:itemID="{F18501AF-04CF-4482-BAE1-607B49DDC378}">
-  <ds:schemaRefs>
-    <ds:schemaRef ds:uri="http://schemas.microsoft.com/sharepoint/v3/contenttype/forms"/>
-  </ds:schemaRefs>
-</ds:datastoreItem>
-</file>
-
-<file path=customXml/itemProps3.xml><?xml version="1.0" encoding="utf-8"?>
-<ds:datastoreItem xmlns:ds="http://schemas.openxmlformats.org/officeDocument/2006/customXml" ds:itemID="{255F5BEB-6AD6-480A-8556-C80C5EBC10F2}">
-  <ds:schemaRefs>
-    <ds:schemaRef ds:uri="http://schemas.microsoft.com/office/2006/metadata/contentType"/>
-    <ds:schemaRef ds:uri="http://schemas.microsoft.com/office/2006/metadata/properties/metaAttributes"/>
-    <ds:schemaRef ds:uri="http://www.w3.org/2001/XMLSchema"/>
-    <ds:schemaRef ds:uri="http://schemas.microsoft.com/office/2006/metadata/properties"/>
-    <ds:schemaRef ds:uri="http://schemas.microsoft.com/sharepoint/v3"/>
-    <ds:schemaRef ds:uri="2023ac63-7b75-4916-a9ee-591457758eee"/>
-    <ds:schemaRef ds:uri="d9c797ad-d7c3-4982-82b7-81352a75e4a5"/>
-    <ds:schemaRef ds:uri="http://schemas.microsoft.com/office/2006/documentManagement/types"/>
-    <ds:schemaRef ds:uri="http://schemas.microsoft.com/office/infopath/2007/PartnerControls"/>
-    <ds:schemaRef ds:uri="http://schemas.openxmlformats.org/package/2006/metadata/core-properties"/>
-    <ds:schemaRef ds:uri="http://purl.org/dc/elements/1.1/"/>
-    <ds:schemaRef ds:uri="http://purl.org/dc/terms/"/>
-    <ds:schemaRef ds:uri="http://schemas.microsoft.com/internal/obd"/>
-  </ds:schemaRefs>
-</ds:datastoreItem>
 </file>
</xml_diff>

<commit_message>
Addressed feedback and added clarification to the solution overview
</commit_message>
<xml_diff>
--- a/Whiteboard design session/WDS trainer presentation - Cosmos DB Real Time Advanced Analytics.pptx
+++ b/Whiteboard design session/WDS trainer presentation - Cosmos DB Real Time Advanced Analytics.pptx
@@ -238,7 +238,7 @@
           <a:p>
             <a:fld id="{52A13B17-C506-4D51-BB37-16B365906619}" type="datetimeFigureOut">
               <a:rPr lang="en-US" smtClean="0"/>
-              <a:t>9/28/2020</a:t>
+              <a:t>10/9/2020</a:t>
             </a:fld>
             <a:endParaRPr lang="en-US" dirty="0"/>
           </a:p>
@@ -1113,135 +1113,239 @@
           <a:bodyPr/>
           <a:lstStyle/>
           <a:p>
-            <a:pPr algn="l"/>
-            <a:r>
-              <a:rPr lang="en-US" b="0" i="0" dirty="0">
-                <a:solidFill>
-                  <a:srgbClr val="24292E"/>
+            <a:r>
+              <a:rPr lang="en-US" b="0" dirty="0">
+                <a:solidFill>
+                  <a:srgbClr val="D6DEEB"/>
                 </a:solidFill>
                 <a:effectLst/>
-                <a:latin typeface="-apple-system"/>
-              </a:rPr>
-              <a:t>The data flow for the solution begins with the payment transaction systems writing transactions to Azure Cosmos DB. Using the built-in change feed feature in Cosmos DB, the transactions can be read as a stream of incoming data within an Azure Synapse Analytics notebook, using Synapse Link. All transactional data is automatically stored in a fully isolated column store by enabling the Azure Cosmos DB Analytical Store. This store enables large-scale analytics against the operational data in Azure Cosmos DB, without impacting the transactional workloads or incurring resource unit (RU) costs. </a:t>
-            </a:r>
-            <a:r>
-              <a:rPr lang="en-US" b="0" i="0" dirty="0" err="1">
-                <a:solidFill>
-                  <a:srgbClr val="24292E"/>
+                <a:latin typeface="Consolas" panose="020B0609020204030204" pitchFamily="49" charset="0"/>
+              </a:rPr>
+              <a:t>The data flow for the solution begins with the payment transaction systems writing transactions to Azure Cosmos DB. </a:t>
+            </a:r>
+            <a:r>
+              <a:rPr lang="en-US" b="0" dirty="0" err="1">
+                <a:solidFill>
+                  <a:srgbClr val="D6DEEB"/>
                 </a:solidFill>
                 <a:effectLst/>
-                <a:latin typeface="-apple-system"/>
+                <a:latin typeface="Consolas" panose="020B0609020204030204" pitchFamily="49" charset="0"/>
               </a:rPr>
               <a:t>Woodgrove</a:t>
             </a:r>
             <a:r>
-              <a:rPr lang="en-US" b="0" i="0" dirty="0">
-                <a:solidFill>
-                  <a:srgbClr val="24292E"/>
+              <a:rPr lang="en-US" b="0" dirty="0">
+                <a:solidFill>
+                  <a:srgbClr val="D6DEEB"/>
                 </a:solidFill>
                 <a:effectLst/>
-                <a:latin typeface="-apple-system"/>
-              </a:rPr>
-              <a:t> Bank's analysts query historical data contained within the analytical store and use it to join on reference data stored within the analytical store of other containers, as well as the data lake.</a:t>
-            </a:r>
-          </a:p>
-          <a:p>
-            <a:pPr algn="l"/>
-            <a:endParaRPr lang="en-US" b="0" i="0" dirty="0">
-              <a:solidFill>
-                <a:srgbClr val="24292E"/>
-              </a:solidFill>
-              <a:effectLst/>
-              <a:latin typeface="-apple-system"/>
-            </a:endParaRPr>
-          </a:p>
-          <a:p>
-            <a:pPr algn="l"/>
-            <a:r>
-              <a:rPr lang="en-US" b="0" i="0" dirty="0">
-                <a:solidFill>
-                  <a:srgbClr val="24292E"/>
+                <a:latin typeface="Consolas" panose="020B0609020204030204" pitchFamily="49" charset="0"/>
+              </a:rPr>
+              <a:t> Bank enables Synapse Link integration when provisioning the Azure Cosmos DB account. With this feature enabled, they turn on the analytical store when creating each of the containers, which serves as a fully isolated column store that is automatically populated when the payment transaction system writes data to the transactional container. The analytical store enables large-scale analytics against the operational data in Azure Cosmos DB, without impacting the transactional workloads or incurring resource unit (RU) costs. </a:t>
+            </a:r>
+            <a:r>
+              <a:rPr lang="en-US" b="0" dirty="0" err="1">
+                <a:solidFill>
+                  <a:srgbClr val="D6DEEB"/>
                 </a:solidFill>
                 <a:effectLst/>
-                <a:latin typeface="-apple-system"/>
-              </a:rPr>
-              <a:t>Azure Synapse Analytics serves as the end-to-end analytics platform that combines SQL data warehousing, big data analytics, and data integration, and is central to the architecture. Synapse Analytics is required when using the Synapse Link feature that enables the Azure Cosmos DB analytical store.</a:t>
-            </a:r>
-          </a:p>
-          <a:p>
-            <a:pPr algn="l"/>
-            <a:r>
-              <a:rPr lang="en-US" b="0" i="0" dirty="0">
-                <a:solidFill>
-                  <a:srgbClr val="24292E"/>
+                <a:latin typeface="Consolas" panose="020B0609020204030204" pitchFamily="49" charset="0"/>
+              </a:rPr>
+              <a:t>Woodgrove</a:t>
+            </a:r>
+            <a:r>
+              <a:rPr lang="en-US" b="0" dirty="0">
+                <a:solidFill>
+                  <a:srgbClr val="D6DEEB"/>
                 </a:solidFill>
                 <a:effectLst/>
-                <a:latin typeface="-apple-system"/>
-              </a:rPr>
-              <a:t>Azure Machine Learning (Azure ML) is used to train both the real-time and batch machine learning models. The Azure ML workspace stores and manages trained models, and is used to deploy the trained model as a real-time scoring web service running on a highly available Azure Kubernetes Service cluster (AKS cluster). </a:t>
-            </a:r>
-            <a:r>
-              <a:rPr lang="en-US" b="0" i="0" dirty="0" err="1">
-                <a:solidFill>
-                  <a:srgbClr val="24292E"/>
+                <a:latin typeface="Consolas" panose="020B0609020204030204" pitchFamily="49" charset="0"/>
+              </a:rPr>
+              <a:t> Bank's analysts query historical data within the analytical store and use it to join on reference data stored within the analytical store of other containers and the data lake. They execute these queries using Azure Synapse Spark notebooks and Azure Synapse SQL Serverless.</a:t>
+            </a:r>
+          </a:p>
+          <a:p>
+            <a:br>
+              <a:rPr lang="en-US" b="0" dirty="0">
+                <a:solidFill>
+                  <a:srgbClr val="D6DEEB"/>
                 </a:solidFill>
                 <a:effectLst/>
-                <a:latin typeface="-apple-system"/>
+                <a:latin typeface="Consolas" panose="020B0609020204030204" pitchFamily="49" charset="0"/>
+              </a:rPr>
+            </a:br>
+            <a:r>
+              <a:rPr lang="en-US" b="0" dirty="0" err="1">
+                <a:solidFill>
+                  <a:srgbClr val="D6DEEB"/>
+                </a:solidFill>
+                <a:effectLst/>
+                <a:latin typeface="Consolas" panose="020B0609020204030204" pitchFamily="49" charset="0"/>
               </a:rPr>
               <a:t>Woodgrove</a:t>
             </a:r>
             <a:r>
-              <a:rPr lang="en-US" b="0" i="0" dirty="0">
-                <a:solidFill>
-                  <a:srgbClr val="24292E"/>
+              <a:rPr lang="en-US" b="0" dirty="0">
+                <a:solidFill>
+                  <a:srgbClr val="D6DEEB"/>
                 </a:solidFill>
                 <a:effectLst/>
-                <a:latin typeface="-apple-system"/>
-              </a:rPr>
-              <a:t> Bank uses the batch-scoring machine learning model within Azure Synapse Analytics notebooks for predicting fraud against the day's transactions, building aggregates showing statistics around fraudulent activity, and writing the results to an Azure Cosmos DB container. The batch-scoring model is also used within a Synapse notebook to reduce prediction latency by scoring the streaming data from the Azure Cosmos DB change feed, using Spark Structured Streaming. All transactions with "suspicious activity" output are stored in Azure Cosmos DB so it is globally available in regions closest to </a:t>
-            </a:r>
-            <a:r>
-              <a:rPr lang="en-US" b="0" i="0" dirty="0" err="1">
-                <a:solidFill>
-                  <a:srgbClr val="24292E"/>
+                <a:latin typeface="Consolas" panose="020B0609020204030204" pitchFamily="49" charset="0"/>
+              </a:rPr>
+              <a:t> requires that the data retention for payment transactions stored in Azure Cosmos DB is set to 60 days and that all payment transactions need to be stored in long-term storage. To meet these requirements, the 'Transactional Store Time to Live (Transactional TTL)' property on the transactions container is enabled, and the TTL value is set to 60 on the documents. This setting automatically deletes payment transactions from the transactional store after the 60-day time period. The 'Analytical Store Time To Live (Analytical TTL)' setting allows </a:t>
+            </a:r>
+            <a:r>
+              <a:rPr lang="en-US" b="0" dirty="0" err="1">
+                <a:solidFill>
+                  <a:srgbClr val="D6DEEB"/>
                 </a:solidFill>
                 <a:effectLst/>
-                <a:latin typeface="-apple-system"/>
+                <a:latin typeface="Consolas" panose="020B0609020204030204" pitchFamily="49" charset="0"/>
               </a:rPr>
               <a:t>Woodgrove</a:t>
             </a:r>
             <a:r>
-              <a:rPr lang="en-US" b="0" i="0" dirty="0">
-                <a:solidFill>
-                  <a:srgbClr val="24292E"/>
+              <a:rPr lang="en-US" b="0" dirty="0">
+                <a:solidFill>
+                  <a:srgbClr val="D6DEEB"/>
                 </a:solidFill>
                 <a:effectLst/>
-                <a:latin typeface="-apple-system"/>
-              </a:rPr>
-              <a:t> Bank's customers through their web applications. The analytical store feature is enabled on the container that contains predicted suspicious activity. Synapse SQL Serverless views are created against this and other analytical stores and can be accessed by business analysts using dashboards and reports in Power BI, which are embedded within the Synapse Analytics workspace. Data scientists and engineers can create their own reports against the Azure Cosmos DB Analytical Store, using Synapse notebooks.</a:t>
-            </a:r>
-          </a:p>
-          <a:p>
-            <a:pPr algn="l"/>
-            <a:endParaRPr lang="en-US" b="0" i="0" dirty="0">
-              <a:solidFill>
-                <a:srgbClr val="24292E"/>
-              </a:solidFill>
-              <a:effectLst/>
-              <a:latin typeface="-apple-system"/>
-            </a:endParaRPr>
-          </a:p>
-          <a:p>
-            <a:pPr algn="l"/>
-            <a:r>
-              <a:rPr lang="en-US" b="0" i="0" dirty="0">
-                <a:solidFill>
-                  <a:srgbClr val="24292E"/>
+                <a:latin typeface="Consolas" panose="020B0609020204030204" pitchFamily="49" charset="0"/>
+              </a:rPr>
+              <a:t> Bank to manage the lifecycle of data retained in the analytical store independently from the transactional store. The TTL on the analytical store is set never to expire, enabling </a:t>
+            </a:r>
+            <a:r>
+              <a:rPr lang="en-US" b="0" dirty="0" err="1">
+                <a:solidFill>
+                  <a:srgbClr val="D6DEEB"/>
                 </a:solidFill>
                 <a:effectLst/>
-                <a:latin typeface="-apple-system"/>
-              </a:rPr>
-              <a:t>Finally, Azure Key Vault is used to securely store secrets, such as account keys and connection strings. The Synapse Linked Services securely access these secrets, hiding them from Synapse Analytics users who connect to the services.</a:t>
+                <a:latin typeface="Consolas" panose="020B0609020204030204" pitchFamily="49" charset="0"/>
+              </a:rPr>
+              <a:t>Woodgrove</a:t>
+            </a:r>
+            <a:r>
+              <a:rPr lang="en-US" b="0" dirty="0">
+                <a:solidFill>
+                  <a:srgbClr val="D6DEEB"/>
+                </a:solidFill>
+                <a:effectLst/>
+                <a:latin typeface="Consolas" panose="020B0609020204030204" pitchFamily="49" charset="0"/>
+              </a:rPr>
+              <a:t> to seamlessly tier and define the two stores' data retention period.</a:t>
+            </a:r>
+          </a:p>
+          <a:p>
+            <a:br>
+              <a:rPr lang="en-US" b="0" dirty="0">
+                <a:solidFill>
+                  <a:srgbClr val="D6DEEB"/>
+                </a:solidFill>
+                <a:effectLst/>
+                <a:latin typeface="Consolas" panose="020B0609020204030204" pitchFamily="49" charset="0"/>
+              </a:rPr>
+            </a:br>
+            <a:r>
+              <a:rPr lang="en-US" b="0" dirty="0">
+                <a:solidFill>
+                  <a:srgbClr val="D6DEEB"/>
+                </a:solidFill>
+                <a:effectLst/>
+                <a:latin typeface="Consolas" panose="020B0609020204030204" pitchFamily="49" charset="0"/>
+              </a:rPr>
+              <a:t>Azure Synapse Analytics serves as the end-to-end analytics platform that combines SQL data warehousing, big data analytics, and data integration, and is central to the architecture. Synapse Analytics is required when using the Synapse Link feature that enables the Azure Cosmos DB analytical store.</a:t>
+            </a:r>
+          </a:p>
+          <a:p>
+            <a:br>
+              <a:rPr lang="en-US" b="0" dirty="0">
+                <a:solidFill>
+                  <a:srgbClr val="D6DEEB"/>
+                </a:solidFill>
+                <a:effectLst/>
+                <a:latin typeface="Consolas" panose="020B0609020204030204" pitchFamily="49" charset="0"/>
+              </a:rPr>
+            </a:br>
+            <a:r>
+              <a:rPr lang="en-US" b="0" dirty="0">
+                <a:solidFill>
+                  <a:srgbClr val="D6DEEB"/>
+                </a:solidFill>
+                <a:effectLst/>
+                <a:latin typeface="Consolas" panose="020B0609020204030204" pitchFamily="49" charset="0"/>
+              </a:rPr>
+              <a:t>Azure Machine Learning (Azure ML) is used to train both the real-time and batch machine learning models. The Azure ML workspace stores and manages trained models and deploys the trained model as a real-time scoring web service running on a highly available Azure Kubernetes Service cluster (AKS cluster). </a:t>
+            </a:r>
+            <a:r>
+              <a:rPr lang="en-US" b="0" dirty="0" err="1">
+                <a:solidFill>
+                  <a:srgbClr val="D6DEEB"/>
+                </a:solidFill>
+                <a:effectLst/>
+                <a:latin typeface="Consolas" panose="020B0609020204030204" pitchFamily="49" charset="0"/>
+              </a:rPr>
+              <a:t>Woodgrove</a:t>
+            </a:r>
+            <a:r>
+              <a:rPr lang="en-US" b="0" dirty="0">
+                <a:solidFill>
+                  <a:srgbClr val="D6DEEB"/>
+                </a:solidFill>
+                <a:effectLst/>
+                <a:latin typeface="Consolas" panose="020B0609020204030204" pitchFamily="49" charset="0"/>
+              </a:rPr>
+              <a:t> Bank uses the batch-scoring machine learning model within Azure Synapse Analytics notebooks to predict fraud against the day's transactions, build aggregates showing statistics around fraudulent activity, and write the results to an Azure Cosmos DB container. The batch-scoring model is also used within a Synapse notebook to reduce prediction latency by scoring the Azure Cosmos DB change feed's streaming data, using Spark Structured Streaming. All transactions with "suspicious activity" output are stored in Azure Cosmos DB, so it is globally available in regions closest to </a:t>
+            </a:r>
+            <a:r>
+              <a:rPr lang="en-US" b="0" dirty="0" err="1">
+                <a:solidFill>
+                  <a:srgbClr val="D6DEEB"/>
+                </a:solidFill>
+                <a:effectLst/>
+                <a:latin typeface="Consolas" panose="020B0609020204030204" pitchFamily="49" charset="0"/>
+              </a:rPr>
+              <a:t>Woodgrove</a:t>
+            </a:r>
+            <a:r>
+              <a:rPr lang="en-US" b="0" dirty="0">
+                <a:solidFill>
+                  <a:srgbClr val="D6DEEB"/>
+                </a:solidFill>
+                <a:effectLst/>
+                <a:latin typeface="Consolas" panose="020B0609020204030204" pitchFamily="49" charset="0"/>
+              </a:rPr>
+              <a:t> Bank's customers through their web applications. The analytical store feature is enabled on the container that contains predicted suspicious activity. Synapse SQL Serverless views are created against this and other analytical stores. Business analysts can access them using dashboards and reports in Power BI, which are embedded within the Synapse Analytics workspace. Data scientists and engineers can create their own reports against the Azure Cosmos DB Analytical Store, using Synapse notebooks.</a:t>
+            </a:r>
+          </a:p>
+          <a:p>
+            <a:br>
+              <a:rPr lang="en-US" b="0">
+                <a:solidFill>
+                  <a:srgbClr val="D6DEEB"/>
+                </a:solidFill>
+                <a:effectLst/>
+                <a:latin typeface="Consolas" panose="020B0609020204030204" pitchFamily="49" charset="0"/>
+              </a:rPr>
+            </a:br>
+            <a:r>
+              <a:rPr lang="en-US" b="0">
+                <a:solidFill>
+                  <a:srgbClr val="D6DEEB"/>
+                </a:solidFill>
+                <a:effectLst/>
+                <a:latin typeface="Consolas" panose="020B0609020204030204" pitchFamily="49" charset="0"/>
+              </a:rPr>
+              <a:t>Finally</a:t>
+            </a:r>
+            <a:r>
+              <a:rPr lang="en-US" b="0" dirty="0">
+                <a:solidFill>
+                  <a:srgbClr val="D6DEEB"/>
+                </a:solidFill>
+                <a:effectLst/>
+                <a:latin typeface="Consolas" panose="020B0609020204030204" pitchFamily="49" charset="0"/>
+              </a:rPr>
+              <a:t>, Azure Key Vault is used to securely store secrets, such as account keys and connection strings. The Synapse Linked Services securely access these secrets, hiding them from Synapse Analytics users who connect to the services.</a:t>
             </a:r>
           </a:p>
         </p:txBody>
@@ -4988,7 +5092,7 @@
                   <a:prstClr val="black"/>
                 </a:solidFill>
               </a:rPr>
-              <a:t>9/28/2020 6:45 PM</a:t>
+              <a:t>10/9/2020 10:57 AM</a:t>
             </a:fld>
             <a:endParaRPr lang="en-US" dirty="0">
               <a:solidFill>
@@ -20059,11 +20163,11 @@
   <p:clrMapOvr>
     <a:masterClrMapping/>
   </p:clrMapOvr>
-  <mc:AlternateContent xmlns:mc="http://schemas.openxmlformats.org/markup-compatibility/2006">
-    <mc:Choice xmlns:p14="http://schemas.microsoft.com/office/powerpoint/2010/main" Requires="p14">
+  <mc:AlternateContent xmlns:mc="http://schemas.openxmlformats.org/markup-compatibility/2006" xmlns:p14="http://schemas.microsoft.com/office/powerpoint/2010/main">
+    <mc:Choice Requires="p14">
       <p:transition p14:dur="0"/>
     </mc:Choice>
-    <mc:Fallback>
+    <mc:Fallback xmlns="">
       <p:transition/>
     </mc:Fallback>
   </mc:AlternateContent>

</xml_diff>